<commit_message>
Update Part 4 - Introduction to Class Programming.pptx
Cleanup - Removed breadcrumbs from comments that were made against the first draft.
</commit_message>
<xml_diff>
--- a/Part 4 - Introduction to Class Programming.pptx
+++ b/Part 4 - Introduction to Class Programming.pptx
@@ -5,7 +5,7 @@
     <p:sldMasterId id="2147483648" r:id="rId1"/>
   </p:sldMasterIdLst>
   <p:notesMasterIdLst>
-    <p:notesMasterId r:id="rId23"/>
+    <p:notesMasterId r:id="rId28"/>
   </p:notesMasterIdLst>
   <p:sldIdLst>
     <p:sldId id="256" r:id="rId2"/>
@@ -17,18 +17,23 @@
     <p:sldId id="279" r:id="rId8"/>
     <p:sldId id="265" r:id="rId9"/>
     <p:sldId id="268" r:id="rId10"/>
-    <p:sldId id="280" r:id="rId11"/>
-    <p:sldId id="275" r:id="rId12"/>
-    <p:sldId id="266" r:id="rId13"/>
-    <p:sldId id="267" r:id="rId14"/>
-    <p:sldId id="274" r:id="rId15"/>
-    <p:sldId id="263" r:id="rId16"/>
-    <p:sldId id="269" r:id="rId17"/>
-    <p:sldId id="264" r:id="rId18"/>
-    <p:sldId id="261" r:id="rId19"/>
-    <p:sldId id="270" r:id="rId20"/>
-    <p:sldId id="262" r:id="rId21"/>
-    <p:sldId id="260" r:id="rId22"/>
+    <p:sldId id="275" r:id="rId11"/>
+    <p:sldId id="285" r:id="rId12"/>
+    <p:sldId id="280" r:id="rId13"/>
+    <p:sldId id="266" r:id="rId14"/>
+    <p:sldId id="267" r:id="rId15"/>
+    <p:sldId id="274" r:id="rId16"/>
+    <p:sldId id="263" r:id="rId17"/>
+    <p:sldId id="269" r:id="rId18"/>
+    <p:sldId id="264" r:id="rId19"/>
+    <p:sldId id="261" r:id="rId20"/>
+    <p:sldId id="270" r:id="rId21"/>
+    <p:sldId id="262" r:id="rId22"/>
+    <p:sldId id="281" r:id="rId23"/>
+    <p:sldId id="282" r:id="rId24"/>
+    <p:sldId id="283" r:id="rId25"/>
+    <p:sldId id="284" r:id="rId26"/>
+    <p:sldId id="260" r:id="rId27"/>
   </p:sldIdLst>
   <p:sldSz cx="9144000" cy="5143500" type="screen16x9"/>
   <p:notesSz cx="6858000" cy="9144000"/>
@@ -539,321 +544,6 @@
           <a:bodyPr/>
           <a:lstStyle/>
           <a:p>
-            <a:pPr>
-              <a:buFont typeface="+mj-lt"/>
-              <a:buAutoNum type="arabicPeriod"/>
-            </a:pPr>
-            <a:r>
-              <a:rPr lang="en-US" sz="800" dirty="0">
-                <a:solidFill>
-                  <a:schemeClr val="bg1"/>
-                </a:solidFill>
-              </a:rPr>
-              <a:t>When Revving up this deck – below are Sven’s comments. </a:t>
-            </a:r>
-            <a:r>
-              <a:rPr lang="en-US" sz="800" strike="dblStrike" baseline="0" dirty="0">
-                <a:solidFill>
-                  <a:srgbClr val="FF0000"/>
-                </a:solidFill>
-              </a:rPr>
-              <a:t>In addition : Also be sure to copy logos from template and apply here</a:t>
-            </a:r>
-          </a:p>
-          <a:p>
-            <a:pPr>
-              <a:buFont typeface="+mj-lt"/>
-              <a:buAutoNum type="arabicPeriod"/>
-            </a:pPr>
-            <a:endParaRPr lang="en-US" sz="800" dirty="0">
-              <a:solidFill>
-                <a:schemeClr val="bg1"/>
-              </a:solidFill>
-            </a:endParaRPr>
-          </a:p>
-          <a:p>
-            <a:pPr>
-              <a:buFont typeface="+mj-lt"/>
-              <a:buAutoNum type="arabicPeriod"/>
-            </a:pPr>
-            <a:r>
-              <a:rPr lang="en-US" sz="800" strike="dblStrike" kern="1200" baseline="0" dirty="0">
-                <a:solidFill>
-                  <a:srgbClr val="FF0000"/>
-                </a:solidFill>
-                <a:latin typeface="+mn-lt"/>
-                <a:ea typeface="+mn-ea"/>
-                <a:cs typeface="+mn-cs"/>
-              </a:rPr>
-              <a:t>It is interesting comparison is that you start with what a class is and then describe how it is made. We start the other way. :)</a:t>
-            </a:r>
-            <a:br>
-              <a:rPr lang="en-US" sz="800" dirty="0">
-                <a:solidFill>
-                  <a:schemeClr val="bg1"/>
-                </a:solidFill>
-              </a:rPr>
-            </a:br>
-            <a:br>
-              <a:rPr lang="en-US" sz="800" dirty="0">
-                <a:solidFill>
-                  <a:schemeClr val="bg1"/>
-                </a:solidFill>
-              </a:rPr>
-            </a:br>
-            <a:r>
-              <a:rPr lang="en-US" sz="800" strike="dblStrike" baseline="0" dirty="0">
-                <a:solidFill>
-                  <a:schemeClr val="bg1"/>
-                </a:solidFill>
-              </a:rPr>
-              <a:t>Some comments on the slides:</a:t>
-            </a:r>
-            <a:br>
-              <a:rPr lang="en-US" sz="800" strike="dblStrike" baseline="0" dirty="0">
-                <a:solidFill>
-                  <a:schemeClr val="bg1"/>
-                </a:solidFill>
-              </a:rPr>
-            </a:br>
-            <a:r>
-              <a:rPr lang="en-US" sz="800" strike="dblStrike" baseline="0" dirty="0">
-                <a:solidFill>
-                  <a:schemeClr val="bg1"/>
-                </a:solidFill>
-              </a:rPr>
-              <a:t>I'd like to see the use of the keyword "struct" too. Some members may be familiar with "struct" from C programming. Describe the difference between "struct" and "class".</a:t>
-            </a:r>
-            <a:br>
-              <a:rPr lang="en-US" sz="800" strike="dblStrike" baseline="0" dirty="0">
-                <a:solidFill>
-                  <a:schemeClr val="bg1"/>
-                </a:solidFill>
-              </a:rPr>
-            </a:br>
-            <a:endParaRPr lang="en-US" sz="800" strike="dblStrike" baseline="0" dirty="0">
-              <a:solidFill>
-                <a:schemeClr val="bg1"/>
-              </a:solidFill>
-            </a:endParaRPr>
-          </a:p>
-          <a:p>
-            <a:pPr marL="742950" lvl="1" indent="-285750">
-              <a:buFont typeface="Arial" panose="020B0604020202020204" pitchFamily="34" charset="0"/>
-              <a:buChar char="•"/>
-            </a:pPr>
-            <a:r>
-              <a:rPr lang="en-US" sz="800" strike="dblStrike" baseline="0" dirty="0">
-                <a:solidFill>
-                  <a:schemeClr val="bg1"/>
-                </a:solidFill>
-              </a:rPr>
-              <a:t>Chris and I plan to introduce "struct" first and then enhance it into a "class". </a:t>
-            </a:r>
-            <a:br>
-              <a:rPr lang="en-US" sz="800" dirty="0">
-                <a:solidFill>
-                  <a:schemeClr val="bg1"/>
-                </a:solidFill>
-              </a:rPr>
-            </a:br>
-            <a:endParaRPr lang="en-US" sz="800" strike="dblStrike" baseline="0" dirty="0">
-              <a:solidFill>
-                <a:schemeClr val="bg1"/>
-              </a:solidFill>
-            </a:endParaRPr>
-          </a:p>
-          <a:p>
-            <a:pPr>
-              <a:buFont typeface="+mj-lt"/>
-              <a:buAutoNum type="arabicPeriod"/>
-            </a:pPr>
-            <a:r>
-              <a:rPr lang="en-US" sz="800" strike="dblStrike" baseline="0" dirty="0">
-                <a:solidFill>
-                  <a:schemeClr val="bg1"/>
-                </a:solidFill>
-              </a:rPr>
-              <a:t>Please clarify that a class is a type. This helps later on when you describe an object definition that the class name takes the place of a type in the same way as "int" or "char". This also helps understanding the difference between class and object in the same way as many are familiar with types (int, ...) and variables.</a:t>
-            </a:r>
-            <a:br>
-              <a:rPr lang="en-US" sz="800" dirty="0">
-                <a:solidFill>
-                  <a:schemeClr val="bg1"/>
-                </a:solidFill>
-              </a:rPr>
-            </a:br>
-            <a:endParaRPr lang="en-US" sz="800" dirty="0">
-              <a:solidFill>
-                <a:schemeClr val="bg1"/>
-              </a:solidFill>
-            </a:endParaRPr>
-          </a:p>
-          <a:p>
-            <a:pPr>
-              <a:buFont typeface="+mj-lt"/>
-              <a:buAutoNum type="arabicPeriod"/>
-            </a:pPr>
-            <a:r>
-              <a:rPr lang="en-US" sz="800" strike="dblStrike" baseline="0" dirty="0">
-                <a:solidFill>
-                  <a:schemeClr val="bg1"/>
-                </a:solidFill>
-              </a:rPr>
-              <a:t>When you describe the LED2 class, you may want to relate to the Servo class that some may be familiar with already.</a:t>
-            </a:r>
-          </a:p>
-          <a:p>
-            <a:pPr>
-              <a:buFont typeface="+mj-lt"/>
-              <a:buAutoNum type="arabicPeriod"/>
-            </a:pPr>
-            <a:r>
-              <a:rPr lang="en-US" sz="800" strike="dblStrike" baseline="0" dirty="0">
-                <a:solidFill>
-                  <a:schemeClr val="bg1"/>
-                </a:solidFill>
-              </a:rPr>
-              <a:t>Slide 4, item 2 (and Slide 5): Please don't call the objects "members of the class". Members are things inside the class definition such as member functions and member variables/properties. Prefer to say "objects of this class". (In Java </a:t>
-            </a:r>
-            <a:r>
-              <a:rPr lang="en-US" sz="800" strike="dblStrike" baseline="0" dirty="0" err="1">
-                <a:solidFill>
-                  <a:schemeClr val="bg1"/>
-                </a:solidFill>
-              </a:rPr>
-              <a:t>etc</a:t>
-            </a:r>
-            <a:r>
-              <a:rPr lang="en-US" sz="800" strike="dblStrike" baseline="0" dirty="0">
-                <a:solidFill>
-                  <a:schemeClr val="bg1"/>
-                </a:solidFill>
-              </a:rPr>
-              <a:t>, they say that the object is instantiated from the class or a class instance, but in C++ "instantiated" is a term used with templates so it is </a:t>
-            </a:r>
-            <a:r>
-              <a:rPr lang="en-US" sz="800" strike="dblStrike" baseline="0" dirty="0" err="1">
-                <a:solidFill>
-                  <a:schemeClr val="bg1"/>
-                </a:solidFill>
-              </a:rPr>
-              <a:t>is</a:t>
-            </a:r>
-            <a:r>
-              <a:rPr lang="en-US" sz="800" strike="dblStrike" baseline="0" dirty="0">
-                <a:solidFill>
-                  <a:schemeClr val="bg1"/>
-                </a:solidFill>
-              </a:rPr>
-              <a:t> not used with class objects to avoid confusion.)</a:t>
-            </a:r>
-          </a:p>
-          <a:p>
-            <a:pPr>
-              <a:buFont typeface="+mj-lt"/>
-              <a:buAutoNum type="arabicPeriod"/>
-            </a:pPr>
-            <a:r>
-              <a:rPr lang="en-US" sz="800" strike="dblStrike" dirty="0">
-                <a:solidFill>
-                  <a:schemeClr val="bg1"/>
-                </a:solidFill>
-              </a:rPr>
-              <a:t>Slide 6: If you write the definition of myLed1 as "LED2 myLed1 = LED2(13);" then it is easier to see the relationship with definition of a normal variable like "int pin = 13;" that the audience are familiar with. Here is where it is useful to think of LED2 as a type (mentioned in (2) above.) Then you can explain that "LED2 myLed1(13);" does the same thing (generates the same code). There is a slight difference here as the definition with "=" requires that you have an assignment operator, </a:t>
-            </a:r>
-            <a:r>
-              <a:rPr lang="en-US" sz="800" strike="dblStrike" dirty="0" err="1">
-                <a:solidFill>
-                  <a:schemeClr val="bg1"/>
-                </a:solidFill>
-              </a:rPr>
-              <a:t>eventhough</a:t>
-            </a:r>
-            <a:r>
-              <a:rPr lang="en-US" sz="800" strike="dblStrike" dirty="0">
-                <a:solidFill>
-                  <a:schemeClr val="bg1"/>
-                </a:solidFill>
-              </a:rPr>
-              <a:t> it is (usually) optimized away. And you have a default assignment operator by default. You don't have to mention this assignment operator thing here, it will just confuse things. Note also that you can write "int pin(13);" to get the same syntax as object definitions in your slide.</a:t>
-            </a:r>
-            <a:br>
-              <a:rPr lang="en-US" sz="800" dirty="0">
-                <a:solidFill>
-                  <a:schemeClr val="bg1"/>
-                </a:solidFill>
-              </a:rPr>
-            </a:br>
-            <a:endParaRPr lang="en-US" sz="800" dirty="0">
-              <a:solidFill>
-                <a:schemeClr val="bg1"/>
-              </a:solidFill>
-            </a:endParaRPr>
-          </a:p>
-          <a:p>
-            <a:pPr>
-              <a:buFont typeface="+mj-lt"/>
-              <a:buAutoNum type="arabicPeriod"/>
-            </a:pPr>
-            <a:r>
-              <a:rPr lang="en-US" sz="800" strike="sngStrike" baseline="0" dirty="0">
-                <a:solidFill>
-                  <a:schemeClr val="bg1"/>
-                </a:solidFill>
-              </a:rPr>
-              <a:t>Slide 6: You describe constructors in the last few slides. It might be useful to describe that the (13) is a constructor call, which will be described later. Also describe that (13) is a parameter list and that you can have many parameters.</a:t>
-            </a:r>
-          </a:p>
-          <a:p>
-            <a:pPr>
-              <a:buFont typeface="+mj-lt"/>
-              <a:buAutoNum type="arabicPeriod"/>
-            </a:pPr>
-            <a:r>
-              <a:rPr lang="en-US" sz="800" dirty="0">
-                <a:solidFill>
-                  <a:schemeClr val="bg1"/>
-                </a:solidFill>
-              </a:rPr>
-              <a:t>Slide 7: It would be useful if you showed how to implement the "on" and "off" commands before you move on to blinking and all of that complexity.</a:t>
-            </a:r>
-          </a:p>
-          <a:p>
-            <a:pPr>
-              <a:buFont typeface="+mj-lt"/>
-              <a:buAutoNum type="arabicPeriod"/>
-            </a:pPr>
-            <a:r>
-              <a:rPr lang="en-US" sz="800" dirty="0">
-                <a:solidFill>
-                  <a:schemeClr val="bg1"/>
-                </a:solidFill>
-              </a:rPr>
-              <a:t>Slide 16: Please show a class definition where these members are defined first. When it comes to code the audience may have seen class code already and seen both the inline and outline styles. </a:t>
-            </a:r>
-          </a:p>
-          <a:p>
-            <a:r>
-              <a:rPr lang="en-US" sz="800" dirty="0">
-                <a:solidFill>
-                  <a:schemeClr val="bg1"/>
-                </a:solidFill>
-              </a:rPr>
-              <a:t>These are my comments based on my background as a C++ programmer. Take on the comments you agree with.</a:t>
-            </a:r>
-          </a:p>
-          <a:p>
-            <a:r>
-              <a:rPr lang="en-US" sz="800" dirty="0">
-                <a:solidFill>
-                  <a:schemeClr val="bg1"/>
-                </a:solidFill>
-              </a:rPr>
-              <a:t>    / Sven</a:t>
-            </a:r>
-          </a:p>
-          <a:p>
             <a:endParaRPr lang="en-US" dirty="0"/>
           </a:p>
         </p:txBody>
@@ -959,7 +649,7 @@
           <a:p>
             <a:fld id="{AF533E96-F078-4B3D-A8F4-F1AF21EBC357}" type="slidenum">
               <a:rPr lang="en-US" smtClean="0"/>
-              <a:t>18</a:t>
+              <a:t>19</a:t>
             </a:fld>
             <a:endParaRPr lang="en-US"/>
           </a:p>
@@ -1043,7 +733,7 @@
           <a:p>
             <a:fld id="{AF533E96-F078-4B3D-A8F4-F1AF21EBC357}" type="slidenum">
               <a:rPr lang="en-US" smtClean="0"/>
-              <a:t>19</a:t>
+              <a:t>20</a:t>
             </a:fld>
             <a:endParaRPr lang="en-US"/>
           </a:p>
@@ -1127,7 +817,7 @@
           <a:p>
             <a:fld id="{87350B06-B074-48FC-8CFD-53D2CD8FB95F}" type="slidenum">
               <a:rPr lang="en-US" smtClean="0"/>
-              <a:t>21</a:t>
+              <a:t>26</a:t>
             </a:fld>
             <a:endParaRPr lang="en-US"/>
           </a:p>
@@ -1585,7 +1275,7 @@
           <a:p>
             <a:fld id="{AF533E96-F078-4B3D-A8F4-F1AF21EBC357}" type="slidenum">
               <a:rPr lang="en-US" smtClean="0"/>
-              <a:t>10</a:t>
+              <a:t>12</a:t>
             </a:fld>
             <a:endParaRPr lang="en-US"/>
           </a:p>
@@ -1669,7 +1359,7 @@
           <a:p>
             <a:fld id="{AF533E96-F078-4B3D-A8F4-F1AF21EBC357}" type="slidenum">
               <a:rPr lang="en-US" smtClean="0"/>
-              <a:t>12</a:t>
+              <a:t>13</a:t>
             </a:fld>
             <a:endParaRPr lang="en-US"/>
           </a:p>
@@ -1753,7 +1443,7 @@
           <a:p>
             <a:fld id="{AF533E96-F078-4B3D-A8F4-F1AF21EBC357}" type="slidenum">
               <a:rPr lang="en-US" smtClean="0"/>
-              <a:t>14</a:t>
+              <a:t>15</a:t>
             </a:fld>
             <a:endParaRPr lang="en-US"/>
           </a:p>
@@ -1837,7 +1527,7 @@
           <a:p>
             <a:fld id="{87350B06-B074-48FC-8CFD-53D2CD8FB95F}" type="slidenum">
               <a:rPr lang="en-US" smtClean="0"/>
-              <a:t>17</a:t>
+              <a:t>18</a:t>
             </a:fld>
             <a:endParaRPr lang="en-US"/>
           </a:p>
@@ -5751,73 +5441,6 @@
           </a:prstGeom>
         </p:spPr>
       </p:pic>
-      <p:sp>
-        <p:nvSpPr>
-          <p:cNvPr id="8" name="Rectangle 7">
-            <a:extLst>
-              <a:ext uri="{FF2B5EF4-FFF2-40B4-BE49-F238E27FC236}">
-                <a16:creationId xmlns:a16="http://schemas.microsoft.com/office/drawing/2014/main" id="{7E5EBD5C-D3A6-4C65-8ADB-6C89E666766C}"/>
-              </a:ext>
-            </a:extLst>
-          </p:cNvPr>
-          <p:cNvSpPr/>
-          <p:nvPr/>
-        </p:nvSpPr>
-        <p:spPr>
-          <a:xfrm>
-            <a:off x="3429000" y="2114550"/>
-            <a:ext cx="4953000" cy="761552"/>
-          </a:xfrm>
-          <a:prstGeom prst="rect">
-            <a:avLst/>
-          </a:prstGeom>
-          <a:solidFill>
-            <a:srgbClr val="FFFF00"/>
-          </a:solidFill>
-        </p:spPr>
-        <p:style>
-          <a:lnRef idx="2">
-            <a:schemeClr val="accent1">
-              <a:shade val="50000"/>
-            </a:schemeClr>
-          </a:lnRef>
-          <a:fillRef idx="1">
-            <a:schemeClr val="accent1"/>
-          </a:fillRef>
-          <a:effectRef idx="0">
-            <a:schemeClr val="accent1"/>
-          </a:effectRef>
-          <a:fontRef idx="minor">
-            <a:schemeClr val="lt1"/>
-          </a:fontRef>
-        </p:style>
-        <p:txBody>
-          <a:bodyPr rtlCol="0" anchor="ctr"/>
-          <a:lstStyle/>
-          <a:p>
-            <a:pPr algn="ctr"/>
-            <a:r>
-              <a:rPr lang="en-US" dirty="0">
-                <a:solidFill>
-                  <a:schemeClr val="tx1"/>
-                </a:solidFill>
-              </a:rPr>
-              <a:t>Verify Sven’s List in the notes is fully addressed</a:t>
-            </a:r>
-          </a:p>
-          <a:p>
-            <a:pPr algn="ctr"/>
-            <a:r>
-              <a:rPr lang="en-US" dirty="0">
-                <a:solidFill>
-                  <a:schemeClr val="tx1"/>
-                </a:solidFill>
-              </a:rPr>
-              <a:t>Then delete note</a:t>
-            </a:r>
-          </a:p>
-        </p:txBody>
-      </p:sp>
     </p:spTree>
     <p:extLst>
       <p:ext uri="{BB962C8B-B14F-4D97-AF65-F5344CB8AC3E}">
@@ -5858,7 +5481,1525 @@
             <p:ph type="title"/>
           </p:nvPr>
         </p:nvSpPr>
-        <p:spPr/>
+        <p:spPr>
+          <a:xfrm>
+            <a:off x="378103" y="134887"/>
+            <a:ext cx="7016194" cy="552290"/>
+          </a:xfrm>
+        </p:spPr>
+        <p:txBody>
+          <a:bodyPr>
+            <a:normAutofit fontScale="90000"/>
+          </a:bodyPr>
+          <a:lstStyle/>
+          <a:p>
+            <a:r>
+              <a:rPr lang="en-US" dirty="0"/>
+              <a:t>Under the Covers : the </a:t>
+            </a:r>
+            <a:r>
+              <a:rPr lang="en-US" dirty="0">
+                <a:solidFill>
+                  <a:srgbClr val="5EEC3C"/>
+                </a:solidFill>
+              </a:rPr>
+              <a:t>Constructor</a:t>
+            </a:r>
+            <a:endParaRPr lang="en-US" dirty="0"/>
+          </a:p>
+        </p:txBody>
+      </p:sp>
+      <p:grpSp>
+        <p:nvGrpSpPr>
+          <p:cNvPr id="7" name="Group 6">
+            <a:extLst>
+              <a:ext uri="{FF2B5EF4-FFF2-40B4-BE49-F238E27FC236}">
+                <a16:creationId xmlns:a16="http://schemas.microsoft.com/office/drawing/2014/main" id="{E8E89642-A4E7-4100-B141-9E796537661D}"/>
+              </a:ext>
+            </a:extLst>
+          </p:cNvPr>
+          <p:cNvGrpSpPr/>
+          <p:nvPr/>
+        </p:nvGrpSpPr>
+        <p:grpSpPr>
+          <a:xfrm>
+            <a:off x="152400" y="924622"/>
+            <a:ext cx="7890808" cy="2926010"/>
+            <a:chOff x="152400" y="924622"/>
+            <a:chExt cx="7890808" cy="2926010"/>
+          </a:xfrm>
+        </p:grpSpPr>
+        <p:sp>
+          <p:nvSpPr>
+            <p:cNvPr id="41" name="TextBox 40">
+              <a:extLst>
+                <a:ext uri="{FF2B5EF4-FFF2-40B4-BE49-F238E27FC236}">
+                  <a16:creationId xmlns:a16="http://schemas.microsoft.com/office/drawing/2014/main" id="{EE2C6F95-F2D7-4B6D-AA71-8D7B5504F3CF}"/>
+                </a:ext>
+              </a:extLst>
+            </p:cNvPr>
+            <p:cNvSpPr txBox="1"/>
+            <p:nvPr/>
+          </p:nvSpPr>
+          <p:spPr>
+            <a:xfrm>
+              <a:off x="648933" y="2911913"/>
+              <a:ext cx="7394275" cy="938719"/>
+            </a:xfrm>
+            <a:prstGeom prst="rect">
+              <a:avLst/>
+            </a:prstGeom>
+            <a:noFill/>
+          </p:spPr>
+          <p:txBody>
+            <a:bodyPr wrap="square" rtlCol="0">
+              <a:spAutoFit/>
+            </a:bodyPr>
+            <a:lstStyle/>
+            <a:p>
+              <a:r>
+                <a:rPr lang="en-US" sz="1100" b="1" dirty="0">
+                  <a:solidFill>
+                    <a:srgbClr val="0066FF"/>
+                  </a:solidFill>
+                  <a:latin typeface="Courier New" panose="02070309020205020404" pitchFamily="49" charset="0"/>
+                  <a:cs typeface="Courier New" panose="02070309020205020404" pitchFamily="49" charset="0"/>
+                </a:rPr>
+                <a:t>Led2::Led2(byte pin) {</a:t>
+              </a:r>
+            </a:p>
+            <a:p>
+              <a:r>
+                <a:rPr lang="en-US" sz="1100" b="1" dirty="0">
+                  <a:solidFill>
+                    <a:srgbClr val="0066FF"/>
+                  </a:solidFill>
+                  <a:latin typeface="Courier New" panose="02070309020205020404" pitchFamily="49" charset="0"/>
+                  <a:cs typeface="Courier New" panose="02070309020205020404" pitchFamily="49" charset="0"/>
+                </a:rPr>
+                <a:t>  // Save the passed pin</a:t>
+              </a:r>
+            </a:p>
+            <a:p>
+              <a:r>
+                <a:rPr lang="en-US" sz="1100" b="1" dirty="0">
+                  <a:solidFill>
+                    <a:srgbClr val="0066FF"/>
+                  </a:solidFill>
+                  <a:latin typeface="Courier New" panose="02070309020205020404" pitchFamily="49" charset="0"/>
+                  <a:cs typeface="Courier New" panose="02070309020205020404" pitchFamily="49" charset="0"/>
+                </a:rPr>
+                <a:t>  _pin = pin;</a:t>
+              </a:r>
+            </a:p>
+            <a:p>
+              <a:r>
+                <a:rPr lang="en-US" sz="1100" b="1" dirty="0">
+                  <a:solidFill>
+                    <a:srgbClr val="0066FF"/>
+                  </a:solidFill>
+                  <a:latin typeface="Courier New" panose="02070309020205020404" pitchFamily="49" charset="0"/>
+                  <a:cs typeface="Courier New" panose="02070309020205020404" pitchFamily="49" charset="0"/>
+                </a:rPr>
+                <a:t>  init();</a:t>
+              </a:r>
+            </a:p>
+            <a:p>
+              <a:r>
+                <a:rPr lang="en-US" sz="1100" b="1" dirty="0">
+                  <a:solidFill>
+                    <a:srgbClr val="0066FF"/>
+                  </a:solidFill>
+                  <a:latin typeface="Courier New" panose="02070309020205020404" pitchFamily="49" charset="0"/>
+                  <a:cs typeface="Courier New" panose="02070309020205020404" pitchFamily="49" charset="0"/>
+                </a:rPr>
+                <a:t>}</a:t>
+              </a:r>
+            </a:p>
+          </p:txBody>
+        </p:sp>
+        <p:sp>
+          <p:nvSpPr>
+            <p:cNvPr id="42" name="Arrow: Curved Left 41">
+              <a:extLst>
+                <a:ext uri="{FF2B5EF4-FFF2-40B4-BE49-F238E27FC236}">
+                  <a16:creationId xmlns:a16="http://schemas.microsoft.com/office/drawing/2014/main" id="{FD39DF94-F2B7-4A9B-89CA-C643FC828426}"/>
+                </a:ext>
+              </a:extLst>
+            </p:cNvPr>
+            <p:cNvSpPr/>
+            <p:nvPr/>
+          </p:nvSpPr>
+          <p:spPr>
+            <a:xfrm rot="276610" flipH="1">
+              <a:off x="152400" y="1077462"/>
+              <a:ext cx="621506" cy="2282525"/>
+            </a:xfrm>
+            <a:prstGeom prst="curvedLeftArrow">
+              <a:avLst/>
+            </a:prstGeom>
+            <a:solidFill>
+              <a:srgbClr val="5EEC3C"/>
+            </a:solidFill>
+          </p:spPr>
+          <p:style>
+            <a:lnRef idx="2">
+              <a:schemeClr val="accent1">
+                <a:shade val="50000"/>
+              </a:schemeClr>
+            </a:lnRef>
+            <a:fillRef idx="1">
+              <a:schemeClr val="accent1"/>
+            </a:fillRef>
+            <a:effectRef idx="0">
+              <a:schemeClr val="accent1"/>
+            </a:effectRef>
+            <a:fontRef idx="minor">
+              <a:schemeClr val="lt1"/>
+            </a:fontRef>
+          </p:style>
+          <p:txBody>
+            <a:bodyPr rtlCol="0" anchor="ctr"/>
+            <a:lstStyle/>
+            <a:p>
+              <a:pPr algn="ctr"/>
+              <a:endParaRPr lang="en-US">
+                <a:solidFill>
+                  <a:schemeClr val="tx1"/>
+                </a:solidFill>
+              </a:endParaRPr>
+            </a:p>
+          </p:txBody>
+        </p:sp>
+        <p:sp>
+          <p:nvSpPr>
+            <p:cNvPr id="3" name="Speech Bubble: Oval 2">
+              <a:extLst>
+                <a:ext uri="{FF2B5EF4-FFF2-40B4-BE49-F238E27FC236}">
+                  <a16:creationId xmlns:a16="http://schemas.microsoft.com/office/drawing/2014/main" id="{31A1C3FC-8999-49B6-A2F0-5A278E7522BD}"/>
+                </a:ext>
+              </a:extLst>
+            </p:cNvPr>
+            <p:cNvSpPr/>
+            <p:nvPr/>
+          </p:nvSpPr>
+          <p:spPr>
+            <a:xfrm>
+              <a:off x="2901144" y="924622"/>
+              <a:ext cx="4414056" cy="1378391"/>
+            </a:xfrm>
+            <a:prstGeom prst="wedgeEllipseCallout">
+              <a:avLst>
+                <a:gd name="adj1" fmla="val -81371"/>
+                <a:gd name="adj2" fmla="val 89343"/>
+              </a:avLst>
+            </a:prstGeom>
+            <a:solidFill>
+              <a:schemeClr val="accent3">
+                <a:lumMod val="20000"/>
+                <a:lumOff val="80000"/>
+              </a:schemeClr>
+            </a:solidFill>
+          </p:spPr>
+          <p:style>
+            <a:lnRef idx="2">
+              <a:schemeClr val="accent1">
+                <a:shade val="50000"/>
+              </a:schemeClr>
+            </a:lnRef>
+            <a:fillRef idx="1">
+              <a:schemeClr val="accent1"/>
+            </a:fillRef>
+            <a:effectRef idx="0">
+              <a:schemeClr val="accent1"/>
+            </a:effectRef>
+            <a:fontRef idx="minor">
+              <a:schemeClr val="lt1"/>
+            </a:fontRef>
+          </p:style>
+          <p:txBody>
+            <a:bodyPr rtlCol="0" anchor="ctr"/>
+            <a:lstStyle/>
+            <a:p>
+              <a:pPr algn="ctr"/>
+              <a:r>
+                <a:rPr lang="en-US" sz="1600" dirty="0">
+                  <a:solidFill>
+                    <a:schemeClr val="tx1"/>
+                  </a:solidFill>
+                </a:rPr>
+                <a:t>Constructor function has the same name as the class itself. You can pass many parameters if needed (here just one is passed).</a:t>
+              </a:r>
+            </a:p>
+          </p:txBody>
+        </p:sp>
+      </p:grpSp>
+      <p:sp>
+        <p:nvSpPr>
+          <p:cNvPr id="14" name="TextBox 13">
+            <a:extLst>
+              <a:ext uri="{FF2B5EF4-FFF2-40B4-BE49-F238E27FC236}">
+                <a16:creationId xmlns:a16="http://schemas.microsoft.com/office/drawing/2014/main" id="{1258082C-7D26-4A20-A7A3-A4AFAE63295B}"/>
+              </a:ext>
+            </a:extLst>
+          </p:cNvPr>
+          <p:cNvSpPr txBox="1"/>
+          <p:nvPr/>
+        </p:nvSpPr>
+        <p:spPr>
+          <a:xfrm>
+            <a:off x="421503" y="937370"/>
+            <a:ext cx="2467850" cy="307777"/>
+          </a:xfrm>
+          <a:prstGeom prst="rect">
+            <a:avLst/>
+          </a:prstGeom>
+          <a:solidFill>
+            <a:schemeClr val="bg1">
+              <a:lumMod val="85000"/>
+            </a:schemeClr>
+          </a:solidFill>
+          <a:ln>
+            <a:solidFill>
+              <a:srgbClr val="FF0000"/>
+            </a:solidFill>
+          </a:ln>
+        </p:spPr>
+        <p:txBody>
+          <a:bodyPr wrap="square" rtlCol="0">
+            <a:spAutoFit/>
+          </a:bodyPr>
+          <a:lstStyle/>
+          <a:p>
+            <a:r>
+              <a:rPr lang="en-US" sz="1400" b="1" dirty="0">
+                <a:solidFill>
+                  <a:schemeClr val="accent1">
+                    <a:lumMod val="75000"/>
+                  </a:schemeClr>
+                </a:solidFill>
+                <a:latin typeface="Courier New" panose="02070309020205020404" pitchFamily="49" charset="0"/>
+                <a:cs typeface="Courier New" panose="02070309020205020404" pitchFamily="49" charset="0"/>
+              </a:rPr>
+              <a:t>LED2</a:t>
+            </a:r>
+            <a:r>
+              <a:rPr lang="en-US" sz="1400" dirty="0">
+                <a:solidFill>
+                  <a:schemeClr val="bg1"/>
+                </a:solidFill>
+              </a:rPr>
+              <a:t> </a:t>
+            </a:r>
+            <a:r>
+              <a:rPr lang="en-US" sz="1400" b="1" dirty="0">
+                <a:solidFill>
+                  <a:srgbClr val="00B050"/>
+                </a:solidFill>
+                <a:latin typeface="Courier New" panose="02070309020205020404" pitchFamily="49" charset="0"/>
+                <a:cs typeface="Courier New" panose="02070309020205020404" pitchFamily="49" charset="0"/>
+              </a:rPr>
+              <a:t>myLed1</a:t>
+            </a:r>
+            <a:r>
+              <a:rPr lang="en-US" sz="1400" dirty="0">
+                <a:solidFill>
+                  <a:schemeClr val="bg1"/>
+                </a:solidFill>
+              </a:rPr>
+              <a:t> </a:t>
+            </a:r>
+            <a:r>
+              <a:rPr lang="en-US" sz="1400" dirty="0"/>
+              <a:t>=</a:t>
+            </a:r>
+            <a:r>
+              <a:rPr lang="en-US" sz="1400" dirty="0">
+                <a:solidFill>
+                  <a:schemeClr val="bg1"/>
+                </a:solidFill>
+              </a:rPr>
+              <a:t> </a:t>
+            </a:r>
+            <a:r>
+              <a:rPr lang="en-US" sz="1400" b="1" dirty="0">
+                <a:solidFill>
+                  <a:schemeClr val="accent1">
+                    <a:lumMod val="75000"/>
+                  </a:schemeClr>
+                </a:solidFill>
+                <a:latin typeface="Courier New" panose="02070309020205020404" pitchFamily="49" charset="0"/>
+                <a:cs typeface="Courier New" panose="02070309020205020404" pitchFamily="49" charset="0"/>
+              </a:rPr>
+              <a:t>LED2(13);</a:t>
+            </a:r>
+          </a:p>
+        </p:txBody>
+      </p:sp>
+      <p:grpSp>
+        <p:nvGrpSpPr>
+          <p:cNvPr id="8" name="Group 7">
+            <a:extLst>
+              <a:ext uri="{FF2B5EF4-FFF2-40B4-BE49-F238E27FC236}">
+                <a16:creationId xmlns:a16="http://schemas.microsoft.com/office/drawing/2014/main" id="{7AB53BA2-6BC7-42F9-880A-F4775C46FCB8}"/>
+              </a:ext>
+            </a:extLst>
+          </p:cNvPr>
+          <p:cNvGrpSpPr/>
+          <p:nvPr/>
+        </p:nvGrpSpPr>
+        <p:grpSpPr>
+          <a:xfrm>
+            <a:off x="843550" y="2353943"/>
+            <a:ext cx="8050770" cy="2498836"/>
+            <a:chOff x="843550" y="2353943"/>
+            <a:chExt cx="8050770" cy="2498836"/>
+          </a:xfrm>
+        </p:grpSpPr>
+        <p:sp>
+          <p:nvSpPr>
+            <p:cNvPr id="16" name="Arrow: Curved Left 15">
+              <a:extLst>
+                <a:ext uri="{FF2B5EF4-FFF2-40B4-BE49-F238E27FC236}">
+                  <a16:creationId xmlns:a16="http://schemas.microsoft.com/office/drawing/2014/main" id="{BE7B6BEF-4477-484E-8C49-4406E7983555}"/>
+                </a:ext>
+              </a:extLst>
+            </p:cNvPr>
+            <p:cNvSpPr/>
+            <p:nvPr/>
+          </p:nvSpPr>
+          <p:spPr>
+            <a:xfrm rot="18109822" flipH="1">
+              <a:off x="1264967" y="3530190"/>
+              <a:ext cx="621506" cy="1464340"/>
+            </a:xfrm>
+            <a:prstGeom prst="curvedLeftArrow">
+              <a:avLst/>
+            </a:prstGeom>
+            <a:solidFill>
+              <a:srgbClr val="5EEC3C"/>
+            </a:solidFill>
+          </p:spPr>
+          <p:style>
+            <a:lnRef idx="2">
+              <a:schemeClr val="accent1">
+                <a:shade val="50000"/>
+              </a:schemeClr>
+            </a:lnRef>
+            <a:fillRef idx="1">
+              <a:schemeClr val="accent1"/>
+            </a:fillRef>
+            <a:effectRef idx="0">
+              <a:schemeClr val="accent1"/>
+            </a:effectRef>
+            <a:fontRef idx="minor">
+              <a:schemeClr val="lt1"/>
+            </a:fontRef>
+          </p:style>
+          <p:txBody>
+            <a:bodyPr rtlCol="0" anchor="ctr"/>
+            <a:lstStyle/>
+            <a:p>
+              <a:pPr algn="ctr"/>
+              <a:endParaRPr lang="en-US">
+                <a:solidFill>
+                  <a:schemeClr val="tx1"/>
+                </a:solidFill>
+              </a:endParaRPr>
+            </a:p>
+          </p:txBody>
+        </p:sp>
+        <p:sp>
+          <p:nvSpPr>
+            <p:cNvPr id="18" name="TextBox 17">
+              <a:extLst>
+                <a:ext uri="{FF2B5EF4-FFF2-40B4-BE49-F238E27FC236}">
+                  <a16:creationId xmlns:a16="http://schemas.microsoft.com/office/drawing/2014/main" id="{899B5F8C-C936-4AC7-91E2-CB7B26E1DE86}"/>
+                </a:ext>
+              </a:extLst>
+            </p:cNvPr>
+            <p:cNvSpPr txBox="1"/>
+            <p:nvPr/>
+          </p:nvSpPr>
+          <p:spPr>
+            <a:xfrm>
+              <a:off x="2286000" y="3790950"/>
+              <a:ext cx="6608320" cy="1061829"/>
+            </a:xfrm>
+            <a:prstGeom prst="rect">
+              <a:avLst/>
+            </a:prstGeom>
+            <a:noFill/>
+          </p:spPr>
+          <p:txBody>
+            <a:bodyPr wrap="square" rtlCol="0">
+              <a:spAutoFit/>
+            </a:bodyPr>
+            <a:lstStyle>
+              <a:defPPr>
+                <a:defRPr lang="en-US"/>
+              </a:defPPr>
+              <a:lvl1pPr>
+                <a:defRPr sz="1100" b="1">
+                  <a:solidFill>
+                    <a:srgbClr val="0066FF"/>
+                  </a:solidFill>
+                  <a:latin typeface="Courier New" panose="02070309020205020404" pitchFamily="49" charset="0"/>
+                  <a:cs typeface="Courier New" panose="02070309020205020404" pitchFamily="49" charset="0"/>
+                </a:defRPr>
+              </a:lvl1pPr>
+            </a:lstStyle>
+            <a:p>
+              <a:r>
+                <a:rPr lang="en-US" sz="900" dirty="0"/>
+                <a:t>void Led2::init() {</a:t>
+              </a:r>
+            </a:p>
+            <a:p>
+              <a:r>
+                <a:rPr lang="en-US" sz="900" dirty="0"/>
+                <a:t>  pinMode(_pin, OUTPUT);</a:t>
+              </a:r>
+            </a:p>
+            <a:p>
+              <a:r>
+                <a:rPr lang="en-US" sz="900" dirty="0"/>
+                <a:t>  // Initialize local variables for the new class member</a:t>
+              </a:r>
+            </a:p>
+            <a:p>
+              <a:r>
+                <a:rPr lang="en-US" sz="900" dirty="0"/>
+                <a:t>  _state = LOW;                     // start with LED on the off condition</a:t>
+              </a:r>
+            </a:p>
+            <a:p>
+              <a:r>
+                <a:rPr lang="en-US" sz="900" dirty="0"/>
+                <a:t>  _blink = false;                   // no blinking at initialization</a:t>
+              </a:r>
+            </a:p>
+            <a:p>
+              <a:r>
+                <a:rPr lang="en-US" sz="900" dirty="0"/>
+                <a:t>  off();                            // call the function that sets out LED to off initially</a:t>
+              </a:r>
+            </a:p>
+            <a:p>
+              <a:r>
+                <a:rPr lang="en-US" sz="900" dirty="0"/>
+                <a:t>}</a:t>
+              </a:r>
+            </a:p>
+          </p:txBody>
+        </p:sp>
+        <p:sp>
+          <p:nvSpPr>
+            <p:cNvPr id="19" name="Speech Bubble: Oval 18">
+              <a:extLst>
+                <a:ext uri="{FF2B5EF4-FFF2-40B4-BE49-F238E27FC236}">
+                  <a16:creationId xmlns:a16="http://schemas.microsoft.com/office/drawing/2014/main" id="{9C8EFEC3-D277-414E-BF2F-BBDC223A335E}"/>
+                </a:ext>
+              </a:extLst>
+            </p:cNvPr>
+            <p:cNvSpPr/>
+            <p:nvPr/>
+          </p:nvSpPr>
+          <p:spPr>
+            <a:xfrm>
+              <a:off x="3733800" y="2353943"/>
+              <a:ext cx="4953000" cy="1061828"/>
+            </a:xfrm>
+            <a:prstGeom prst="wedgeEllipseCallout">
+              <a:avLst>
+                <a:gd name="adj1" fmla="val -60046"/>
+                <a:gd name="adj2" fmla="val 88153"/>
+              </a:avLst>
+            </a:prstGeom>
+            <a:solidFill>
+              <a:schemeClr val="accent3">
+                <a:lumMod val="20000"/>
+                <a:lumOff val="80000"/>
+              </a:schemeClr>
+            </a:solidFill>
+          </p:spPr>
+          <p:style>
+            <a:lnRef idx="2">
+              <a:schemeClr val="accent1">
+                <a:shade val="50000"/>
+              </a:schemeClr>
+            </a:lnRef>
+            <a:fillRef idx="1">
+              <a:schemeClr val="accent1"/>
+            </a:fillRef>
+            <a:effectRef idx="0">
+              <a:schemeClr val="accent1"/>
+            </a:effectRef>
+            <a:fontRef idx="minor">
+              <a:schemeClr val="lt1"/>
+            </a:fontRef>
+          </p:style>
+          <p:txBody>
+            <a:bodyPr rtlCol="0" anchor="ctr"/>
+            <a:lstStyle/>
+            <a:p>
+              <a:pPr algn="ctr"/>
+              <a:r>
+                <a:rPr lang="en-US" sz="1600" dirty="0">
+                  <a:solidFill>
+                    <a:schemeClr val="tx1"/>
+                  </a:solidFill>
+                </a:rPr>
+                <a:t>Classes commonly have functions inside. The function may or may or may not be private (visible outside the class).</a:t>
+              </a:r>
+            </a:p>
+          </p:txBody>
+        </p:sp>
+      </p:grpSp>
+    </p:spTree>
+    <p:extLst>
+      <p:ext uri="{BB962C8B-B14F-4D97-AF65-F5344CB8AC3E}">
+        <p14:creationId xmlns:p14="http://schemas.microsoft.com/office/powerpoint/2010/main" val="2353939467"/>
+      </p:ext>
+    </p:extLst>
+  </p:cSld>
+  <p:clrMapOvr>
+    <a:masterClrMapping/>
+  </p:clrMapOvr>
+  <p:timing>
+    <p:tnLst>
+      <p:par>
+        <p:cTn id="1" dur="indefinite" restart="never" nodeType="tmRoot">
+          <p:childTnLst>
+            <p:seq concurrent="1" nextAc="seek">
+              <p:cTn id="2" dur="indefinite" nodeType="mainSeq">
+                <p:childTnLst>
+                  <p:par>
+                    <p:cTn id="3" fill="hold">
+                      <p:stCondLst>
+                        <p:cond delay="indefinite"/>
+                        <p:cond evt="onBegin" delay="0">
+                          <p:tn val="2"/>
+                        </p:cond>
+                      </p:stCondLst>
+                      <p:childTnLst>
+                        <p:par>
+                          <p:cTn id="4" fill="hold">
+                            <p:stCondLst>
+                              <p:cond delay="0"/>
+                            </p:stCondLst>
+                            <p:childTnLst>
+                              <p:par>
+                                <p:cTn id="5" presetID="1" presetClass="entr" presetSubtype="0" fill="hold" grpId="0" nodeType="afterEffect">
+                                  <p:stCondLst>
+                                    <p:cond delay="0"/>
+                                  </p:stCondLst>
+                                  <p:childTnLst>
+                                    <p:set>
+                                      <p:cBhvr>
+                                        <p:cTn id="6" dur="1" fill="hold">
+                                          <p:stCondLst>
+                                            <p:cond delay="0"/>
+                                          </p:stCondLst>
+                                        </p:cTn>
+                                        <p:tgtEl>
+                                          <p:spTgt spid="14"/>
+                                        </p:tgtEl>
+                                        <p:attrNameLst>
+                                          <p:attrName>style.visibility</p:attrName>
+                                        </p:attrNameLst>
+                                      </p:cBhvr>
+                                      <p:to>
+                                        <p:strVal val="visible"/>
+                                      </p:to>
+                                    </p:set>
+                                  </p:childTnLst>
+                                </p:cTn>
+                              </p:par>
+                            </p:childTnLst>
+                          </p:cTn>
+                        </p:par>
+                      </p:childTnLst>
+                    </p:cTn>
+                  </p:par>
+                  <p:par>
+                    <p:cTn id="7" fill="hold">
+                      <p:stCondLst>
+                        <p:cond delay="indefinite"/>
+                      </p:stCondLst>
+                      <p:childTnLst>
+                        <p:par>
+                          <p:cTn id="8" fill="hold">
+                            <p:stCondLst>
+                              <p:cond delay="0"/>
+                            </p:stCondLst>
+                            <p:childTnLst>
+                              <p:par>
+                                <p:cTn id="9" presetID="1" presetClass="entr" presetSubtype="0" fill="hold" nodeType="clickEffect">
+                                  <p:stCondLst>
+                                    <p:cond delay="0"/>
+                                  </p:stCondLst>
+                                  <p:childTnLst>
+                                    <p:set>
+                                      <p:cBhvr>
+                                        <p:cTn id="10" dur="1" fill="hold">
+                                          <p:stCondLst>
+                                            <p:cond delay="0"/>
+                                          </p:stCondLst>
+                                        </p:cTn>
+                                        <p:tgtEl>
+                                          <p:spTgt spid="7"/>
+                                        </p:tgtEl>
+                                        <p:attrNameLst>
+                                          <p:attrName>style.visibility</p:attrName>
+                                        </p:attrNameLst>
+                                      </p:cBhvr>
+                                      <p:to>
+                                        <p:strVal val="visible"/>
+                                      </p:to>
+                                    </p:set>
+                                  </p:childTnLst>
+                                </p:cTn>
+                              </p:par>
+                            </p:childTnLst>
+                          </p:cTn>
+                        </p:par>
+                      </p:childTnLst>
+                    </p:cTn>
+                  </p:par>
+                  <p:par>
+                    <p:cTn id="11" fill="hold">
+                      <p:stCondLst>
+                        <p:cond delay="indefinite"/>
+                      </p:stCondLst>
+                      <p:childTnLst>
+                        <p:par>
+                          <p:cTn id="12" fill="hold">
+                            <p:stCondLst>
+                              <p:cond delay="0"/>
+                            </p:stCondLst>
+                            <p:childTnLst>
+                              <p:par>
+                                <p:cTn id="13" presetID="10" presetClass="entr" presetSubtype="0" fill="hold" nodeType="clickEffect">
+                                  <p:stCondLst>
+                                    <p:cond delay="0"/>
+                                  </p:stCondLst>
+                                  <p:childTnLst>
+                                    <p:set>
+                                      <p:cBhvr>
+                                        <p:cTn id="14" dur="1" fill="hold">
+                                          <p:stCondLst>
+                                            <p:cond delay="0"/>
+                                          </p:stCondLst>
+                                        </p:cTn>
+                                        <p:tgtEl>
+                                          <p:spTgt spid="8"/>
+                                        </p:tgtEl>
+                                        <p:attrNameLst>
+                                          <p:attrName>style.visibility</p:attrName>
+                                        </p:attrNameLst>
+                                      </p:cBhvr>
+                                      <p:to>
+                                        <p:strVal val="visible"/>
+                                      </p:to>
+                                    </p:set>
+                                    <p:animEffect transition="in" filter="fade">
+                                      <p:cBhvr>
+                                        <p:cTn id="15" dur="500"/>
+                                        <p:tgtEl>
+                                          <p:spTgt spid="8"/>
+                                        </p:tgtEl>
+                                      </p:cBhvr>
+                                    </p:animEffect>
+                                  </p:childTnLst>
+                                </p:cTn>
+                              </p:par>
+                            </p:childTnLst>
+                          </p:cTn>
+                        </p:par>
+                      </p:childTnLst>
+                    </p:cTn>
+                  </p:par>
+                </p:childTnLst>
+              </p:cTn>
+              <p:prevCondLst>
+                <p:cond evt="onPrev" delay="0">
+                  <p:tgtEl>
+                    <p:sldTgt/>
+                  </p:tgtEl>
+                </p:cond>
+              </p:prevCondLst>
+              <p:nextCondLst>
+                <p:cond evt="onNext" delay="0">
+                  <p:tgtEl>
+                    <p:sldTgt/>
+                  </p:tgtEl>
+                </p:cond>
+              </p:nextCondLst>
+            </p:seq>
+          </p:childTnLst>
+        </p:cTn>
+      </p:par>
+    </p:tnLst>
+    <p:bldLst>
+      <p:bldP spid="14" grpId="0" animBg="1"/>
+    </p:bldLst>
+  </p:timing>
+</p:sld>
+</file>
+
+<file path=ppt/slides/slide11.xml><?xml version="1.0" encoding="utf-8"?>
+<p:sld xmlns:a="http://schemas.openxmlformats.org/drawingml/2006/main" xmlns:r="http://schemas.openxmlformats.org/officeDocument/2006/relationships" xmlns:p="http://schemas.openxmlformats.org/presentationml/2006/main">
+  <p:cSld>
+    <p:spTree>
+      <p:nvGrpSpPr>
+        <p:cNvPr id="1" name=""/>
+        <p:cNvGrpSpPr/>
+        <p:nvPr/>
+      </p:nvGrpSpPr>
+      <p:grpSpPr>
+        <a:xfrm>
+          <a:off x="0" y="0"/>
+          <a:ext cx="0" cy="0"/>
+          <a:chOff x="0" y="0"/>
+          <a:chExt cx="0" cy="0"/>
+        </a:xfrm>
+      </p:grpSpPr>
+      <p:sp>
+        <p:nvSpPr>
+          <p:cNvPr id="4" name="Title 3"/>
+          <p:cNvSpPr>
+            <a:spLocks noGrp="1"/>
+          </p:cNvSpPr>
+          <p:nvPr>
+            <p:ph type="title"/>
+          </p:nvPr>
+        </p:nvSpPr>
+        <p:spPr>
+          <a:xfrm>
+            <a:off x="378103" y="134887"/>
+            <a:ext cx="7016194" cy="552290"/>
+          </a:xfrm>
+        </p:spPr>
+        <p:txBody>
+          <a:bodyPr>
+            <a:normAutofit fontScale="90000"/>
+          </a:bodyPr>
+          <a:lstStyle/>
+          <a:p>
+            <a:r>
+              <a:rPr lang="en-US" dirty="0"/>
+              <a:t>Under the Covers : the </a:t>
+            </a:r>
+            <a:r>
+              <a:rPr lang="en-US" dirty="0">
+                <a:solidFill>
+                  <a:srgbClr val="5EEC3C"/>
+                </a:solidFill>
+              </a:rPr>
+              <a:t>on() </a:t>
+            </a:r>
+            <a:r>
+              <a:rPr lang="en-US" dirty="0"/>
+              <a:t>property</a:t>
+            </a:r>
+          </a:p>
+        </p:txBody>
+      </p:sp>
+      <p:sp>
+        <p:nvSpPr>
+          <p:cNvPr id="2" name="Flowchart: Card 1">
+            <a:extLst>
+              <a:ext uri="{FF2B5EF4-FFF2-40B4-BE49-F238E27FC236}">
+                <a16:creationId xmlns:a16="http://schemas.microsoft.com/office/drawing/2014/main" id="{D28882D0-34A9-4243-A02D-162E9AC1F25A}"/>
+              </a:ext>
+            </a:extLst>
+          </p:cNvPr>
+          <p:cNvSpPr/>
+          <p:nvPr/>
+        </p:nvSpPr>
+        <p:spPr>
+          <a:xfrm>
+            <a:off x="2802592" y="1142000"/>
+            <a:ext cx="1905000" cy="1074674"/>
+          </a:xfrm>
+          <a:prstGeom prst="flowChartPunchedCard">
+            <a:avLst/>
+          </a:prstGeom>
+        </p:spPr>
+        <p:style>
+          <a:lnRef idx="2">
+            <a:schemeClr val="accent1">
+              <a:shade val="50000"/>
+            </a:schemeClr>
+          </a:lnRef>
+          <a:fillRef idx="1">
+            <a:schemeClr val="accent1"/>
+          </a:fillRef>
+          <a:effectRef idx="0">
+            <a:schemeClr val="accent1"/>
+          </a:effectRef>
+          <a:fontRef idx="minor">
+            <a:schemeClr val="lt1"/>
+          </a:fontRef>
+        </p:style>
+        <p:txBody>
+          <a:bodyPr rtlCol="0" anchor="ctr"/>
+          <a:lstStyle/>
+          <a:p>
+            <a:pPr algn="ctr"/>
+            <a:r>
+              <a:rPr lang="en-US" dirty="0"/>
+              <a:t>LED2 Class</a:t>
+            </a:r>
+          </a:p>
+        </p:txBody>
+      </p:sp>
+      <p:grpSp>
+        <p:nvGrpSpPr>
+          <p:cNvPr id="13" name="Group 12">
+            <a:extLst>
+              <a:ext uri="{FF2B5EF4-FFF2-40B4-BE49-F238E27FC236}">
+                <a16:creationId xmlns:a16="http://schemas.microsoft.com/office/drawing/2014/main" id="{7FD52B14-EFFC-4063-A6BD-6A39F416055E}"/>
+              </a:ext>
+            </a:extLst>
+          </p:cNvPr>
+          <p:cNvGrpSpPr/>
+          <p:nvPr/>
+        </p:nvGrpSpPr>
+        <p:grpSpPr>
+          <a:xfrm>
+            <a:off x="1295400" y="1220627"/>
+            <a:ext cx="1600200" cy="311956"/>
+            <a:chOff x="1200150" y="1573994"/>
+            <a:chExt cx="1600200" cy="311956"/>
+          </a:xfrm>
+        </p:grpSpPr>
+        <p:sp>
+          <p:nvSpPr>
+            <p:cNvPr id="11" name="Arrow: Right 10">
+              <a:extLst>
+                <a:ext uri="{FF2B5EF4-FFF2-40B4-BE49-F238E27FC236}">
+                  <a16:creationId xmlns:a16="http://schemas.microsoft.com/office/drawing/2014/main" id="{2E2972D8-57E5-4E8E-9D3C-C2059DADAB64}"/>
+                </a:ext>
+              </a:extLst>
+            </p:cNvPr>
+            <p:cNvSpPr/>
+            <p:nvPr/>
+          </p:nvSpPr>
+          <p:spPr>
+            <a:xfrm>
+              <a:off x="1295400" y="1777937"/>
+              <a:ext cx="1371600" cy="108013"/>
+            </a:xfrm>
+            <a:prstGeom prst="rightArrow">
+              <a:avLst/>
+            </a:prstGeom>
+          </p:spPr>
+          <p:style>
+            <a:lnRef idx="2">
+              <a:schemeClr val="accent3">
+                <a:shade val="50000"/>
+              </a:schemeClr>
+            </a:lnRef>
+            <a:fillRef idx="1">
+              <a:schemeClr val="accent3"/>
+            </a:fillRef>
+            <a:effectRef idx="0">
+              <a:schemeClr val="accent3"/>
+            </a:effectRef>
+            <a:fontRef idx="minor">
+              <a:schemeClr val="lt1"/>
+            </a:fontRef>
+          </p:style>
+          <p:txBody>
+            <a:bodyPr rtlCol="0" anchor="ctr"/>
+            <a:lstStyle/>
+            <a:p>
+              <a:pPr algn="ctr"/>
+              <a:endParaRPr lang="en-US"/>
+            </a:p>
+          </p:txBody>
+        </p:sp>
+        <p:sp>
+          <p:nvSpPr>
+            <p:cNvPr id="12" name="TextBox 11">
+              <a:extLst>
+                <a:ext uri="{FF2B5EF4-FFF2-40B4-BE49-F238E27FC236}">
+                  <a16:creationId xmlns:a16="http://schemas.microsoft.com/office/drawing/2014/main" id="{0EBC5A7F-2651-44EE-9BCC-86D9068972AA}"/>
+                </a:ext>
+              </a:extLst>
+            </p:cNvPr>
+            <p:cNvSpPr txBox="1"/>
+            <p:nvPr/>
+          </p:nvSpPr>
+          <p:spPr>
+            <a:xfrm>
+              <a:off x="1200150" y="1573994"/>
+              <a:ext cx="1600200" cy="276999"/>
+            </a:xfrm>
+            <a:prstGeom prst="rect">
+              <a:avLst/>
+            </a:prstGeom>
+            <a:noFill/>
+          </p:spPr>
+          <p:txBody>
+            <a:bodyPr wrap="square" rtlCol="0">
+              <a:spAutoFit/>
+            </a:bodyPr>
+            <a:lstStyle/>
+            <a:p>
+              <a:r>
+                <a:rPr lang="en-US" sz="1200" dirty="0"/>
+                <a:t>“on” Command</a:t>
+              </a:r>
+            </a:p>
+          </p:txBody>
+        </p:sp>
+      </p:grpSp>
+      <p:sp>
+        <p:nvSpPr>
+          <p:cNvPr id="17" name="TextBox 16">
+            <a:extLst>
+              <a:ext uri="{FF2B5EF4-FFF2-40B4-BE49-F238E27FC236}">
+                <a16:creationId xmlns:a16="http://schemas.microsoft.com/office/drawing/2014/main" id="{663BA15D-FD0A-4A2D-B956-2CD35EABA77D}"/>
+              </a:ext>
+            </a:extLst>
+          </p:cNvPr>
+          <p:cNvSpPr txBox="1"/>
+          <p:nvPr/>
+        </p:nvSpPr>
+        <p:spPr>
+          <a:xfrm>
+            <a:off x="609600" y="2527088"/>
+            <a:ext cx="3429000" cy="307777"/>
+          </a:xfrm>
+          <a:prstGeom prst="rect">
+            <a:avLst/>
+          </a:prstGeom>
+          <a:noFill/>
+        </p:spPr>
+        <p:txBody>
+          <a:bodyPr wrap="square" rtlCol="0">
+            <a:spAutoFit/>
+          </a:bodyPr>
+          <a:lstStyle/>
+          <a:p>
+            <a:r>
+              <a:rPr lang="en-US" sz="1400" b="1" dirty="0">
+                <a:solidFill>
+                  <a:srgbClr val="00B050"/>
+                </a:solidFill>
+                <a:latin typeface="Courier New" panose="02070309020205020404" pitchFamily="49" charset="0"/>
+                <a:cs typeface="Courier New" panose="02070309020205020404" pitchFamily="49" charset="0"/>
+              </a:rPr>
+              <a:t>myLed1.on();</a:t>
+            </a:r>
+          </a:p>
+        </p:txBody>
+      </p:sp>
+      <p:grpSp>
+        <p:nvGrpSpPr>
+          <p:cNvPr id="43" name="Group 42">
+            <a:extLst>
+              <a:ext uri="{FF2B5EF4-FFF2-40B4-BE49-F238E27FC236}">
+                <a16:creationId xmlns:a16="http://schemas.microsoft.com/office/drawing/2014/main" id="{93D2071D-53D8-4A20-B30D-4686B50120F7}"/>
+              </a:ext>
+            </a:extLst>
+          </p:cNvPr>
+          <p:cNvGrpSpPr/>
+          <p:nvPr/>
+        </p:nvGrpSpPr>
+        <p:grpSpPr>
+          <a:xfrm>
+            <a:off x="189062" y="2838771"/>
+            <a:ext cx="7394275" cy="1828310"/>
+            <a:chOff x="189062" y="2838771"/>
+            <a:chExt cx="7394275" cy="1828310"/>
+          </a:xfrm>
+        </p:grpSpPr>
+        <p:sp>
+          <p:nvSpPr>
+            <p:cNvPr id="41" name="TextBox 40">
+              <a:extLst>
+                <a:ext uri="{FF2B5EF4-FFF2-40B4-BE49-F238E27FC236}">
+                  <a16:creationId xmlns:a16="http://schemas.microsoft.com/office/drawing/2014/main" id="{EE2C6F95-F2D7-4B6D-AA71-8D7B5504F3CF}"/>
+                </a:ext>
+              </a:extLst>
+            </p:cNvPr>
+            <p:cNvSpPr txBox="1"/>
+            <p:nvPr/>
+          </p:nvSpPr>
+          <p:spPr>
+            <a:xfrm>
+              <a:off x="189062" y="3897640"/>
+              <a:ext cx="7394275" cy="769441"/>
+            </a:xfrm>
+            <a:prstGeom prst="rect">
+              <a:avLst/>
+            </a:prstGeom>
+            <a:noFill/>
+          </p:spPr>
+          <p:txBody>
+            <a:bodyPr wrap="square" rtlCol="0">
+              <a:spAutoFit/>
+            </a:bodyPr>
+            <a:lstStyle/>
+            <a:p>
+              <a:r>
+                <a:rPr lang="en-US" sz="1100" dirty="0">
+                  <a:latin typeface="Courier New" panose="02070309020205020404" pitchFamily="49" charset="0"/>
+                  <a:cs typeface="Courier New" panose="02070309020205020404" pitchFamily="49" charset="0"/>
+                </a:rPr>
+                <a:t>void Led2::on() {</a:t>
+              </a:r>
+            </a:p>
+            <a:p>
+              <a:r>
+                <a:rPr lang="en-US" sz="1100" dirty="0">
+                  <a:latin typeface="Courier New" panose="02070309020205020404" pitchFamily="49" charset="0"/>
+                  <a:cs typeface="Courier New" panose="02070309020205020404" pitchFamily="49" charset="0"/>
+                </a:rPr>
+                <a:t>  _blink = false; // Turn off blink mode</a:t>
+              </a:r>
+            </a:p>
+            <a:p>
+              <a:r>
+                <a:rPr lang="en-US" sz="1100" dirty="0">
+                  <a:latin typeface="Courier New" panose="02070309020205020404" pitchFamily="49" charset="0"/>
+                  <a:cs typeface="Courier New" panose="02070309020205020404" pitchFamily="49" charset="0"/>
+                </a:rPr>
+                <a:t>  _state = HIGH;  // Set desired state LED will turn on with next call to update</a:t>
+              </a:r>
+            </a:p>
+            <a:p>
+              <a:r>
+                <a:rPr lang="en-US" sz="1100" dirty="0">
+                  <a:latin typeface="Courier New" panose="02070309020205020404" pitchFamily="49" charset="0"/>
+                  <a:cs typeface="Courier New" panose="02070309020205020404" pitchFamily="49" charset="0"/>
+                </a:rPr>
+                <a:t>}</a:t>
+              </a:r>
+            </a:p>
+          </p:txBody>
+        </p:sp>
+        <p:sp>
+          <p:nvSpPr>
+            <p:cNvPr id="42" name="Arrow: Curved Left 41">
+              <a:extLst>
+                <a:ext uri="{FF2B5EF4-FFF2-40B4-BE49-F238E27FC236}">
+                  <a16:creationId xmlns:a16="http://schemas.microsoft.com/office/drawing/2014/main" id="{FD39DF94-F2B7-4A9B-89CA-C643FC828426}"/>
+                </a:ext>
+              </a:extLst>
+            </p:cNvPr>
+            <p:cNvSpPr/>
+            <p:nvPr/>
+          </p:nvSpPr>
+          <p:spPr>
+            <a:xfrm rot="682364">
+              <a:off x="1757391" y="2838771"/>
+              <a:ext cx="304800" cy="1064500"/>
+            </a:xfrm>
+            <a:prstGeom prst="curvedLeftArrow">
+              <a:avLst/>
+            </a:prstGeom>
+            <a:solidFill>
+              <a:srgbClr val="5EEC3C"/>
+            </a:solidFill>
+          </p:spPr>
+          <p:style>
+            <a:lnRef idx="2">
+              <a:schemeClr val="accent1">
+                <a:shade val="50000"/>
+              </a:schemeClr>
+            </a:lnRef>
+            <a:fillRef idx="1">
+              <a:schemeClr val="accent1"/>
+            </a:fillRef>
+            <a:effectRef idx="0">
+              <a:schemeClr val="accent1"/>
+            </a:effectRef>
+            <a:fontRef idx="minor">
+              <a:schemeClr val="lt1"/>
+            </a:fontRef>
+          </p:style>
+          <p:txBody>
+            <a:bodyPr rtlCol="0" anchor="ctr"/>
+            <a:lstStyle/>
+            <a:p>
+              <a:pPr algn="ctr"/>
+              <a:endParaRPr lang="en-US">
+                <a:solidFill>
+                  <a:schemeClr val="tx1"/>
+                </a:solidFill>
+              </a:endParaRPr>
+            </a:p>
+          </p:txBody>
+        </p:sp>
+      </p:grpSp>
+      <p:sp>
+        <p:nvSpPr>
+          <p:cNvPr id="3" name="Speech Bubble: Oval 2">
+            <a:extLst>
+              <a:ext uri="{FF2B5EF4-FFF2-40B4-BE49-F238E27FC236}">
+                <a16:creationId xmlns:a16="http://schemas.microsoft.com/office/drawing/2014/main" id="{31A1C3FC-8999-49B6-A2F0-5A278E7522BD}"/>
+              </a:ext>
+            </a:extLst>
+          </p:cNvPr>
+          <p:cNvSpPr/>
+          <p:nvPr/>
+        </p:nvSpPr>
+        <p:spPr>
+          <a:xfrm>
+            <a:off x="2590800" y="2527088"/>
+            <a:ext cx="4897772" cy="1103704"/>
+          </a:xfrm>
+          <a:prstGeom prst="wedgeEllipseCallout">
+            <a:avLst>
+              <a:gd name="adj1" fmla="val -61379"/>
+              <a:gd name="adj2" fmla="val 77729"/>
+            </a:avLst>
+          </a:prstGeom>
+          <a:solidFill>
+            <a:schemeClr val="accent3">
+              <a:lumMod val="20000"/>
+              <a:lumOff val="80000"/>
+            </a:schemeClr>
+          </a:solidFill>
+        </p:spPr>
+        <p:style>
+          <a:lnRef idx="2">
+            <a:schemeClr val="accent1">
+              <a:shade val="50000"/>
+            </a:schemeClr>
+          </a:lnRef>
+          <a:fillRef idx="1">
+            <a:schemeClr val="accent1"/>
+          </a:fillRef>
+          <a:effectRef idx="0">
+            <a:schemeClr val="accent1"/>
+          </a:effectRef>
+          <a:fontRef idx="minor">
+            <a:schemeClr val="lt1"/>
+          </a:fontRef>
+        </p:style>
+        <p:txBody>
+          <a:bodyPr rtlCol="0" anchor="ctr"/>
+          <a:lstStyle/>
+          <a:p>
+            <a:pPr algn="ctr"/>
+            <a:r>
+              <a:rPr lang="en-US" dirty="0">
+                <a:solidFill>
+                  <a:schemeClr val="tx1"/>
+                </a:solidFill>
+              </a:rPr>
+              <a:t>On() is a function within the class definition that sets the private internal variable </a:t>
+            </a:r>
+            <a:r>
+              <a:rPr lang="en-US" dirty="0">
+                <a:solidFill>
+                  <a:srgbClr val="C00000"/>
+                </a:solidFill>
+              </a:rPr>
+              <a:t>_state </a:t>
+            </a:r>
+            <a:r>
+              <a:rPr lang="en-US" dirty="0">
+                <a:solidFill>
+                  <a:schemeClr val="tx1"/>
+                </a:solidFill>
+              </a:rPr>
+              <a:t>and </a:t>
+            </a:r>
+            <a:r>
+              <a:rPr lang="en-US" dirty="0">
+                <a:solidFill>
+                  <a:srgbClr val="C00000"/>
+                </a:solidFill>
+              </a:rPr>
+              <a:t>_blink</a:t>
+            </a:r>
+          </a:p>
+        </p:txBody>
+      </p:sp>
+    </p:spTree>
+    <p:extLst>
+      <p:ext uri="{BB962C8B-B14F-4D97-AF65-F5344CB8AC3E}">
+        <p14:creationId xmlns:p14="http://schemas.microsoft.com/office/powerpoint/2010/main" val="3400596601"/>
+      </p:ext>
+    </p:extLst>
+  </p:cSld>
+  <p:clrMapOvr>
+    <a:masterClrMapping/>
+  </p:clrMapOvr>
+  <p:timing>
+    <p:tnLst>
+      <p:par>
+        <p:cTn id="1" dur="indefinite" restart="never" nodeType="tmRoot">
+          <p:childTnLst>
+            <p:seq concurrent="1" nextAc="seek">
+              <p:cTn id="2" dur="indefinite" nodeType="mainSeq">
+                <p:childTnLst>
+                  <p:par>
+                    <p:cTn id="3" fill="hold">
+                      <p:stCondLst>
+                        <p:cond delay="indefinite"/>
+                      </p:stCondLst>
+                      <p:childTnLst>
+                        <p:par>
+                          <p:cTn id="4" fill="hold">
+                            <p:stCondLst>
+                              <p:cond delay="0"/>
+                            </p:stCondLst>
+                            <p:childTnLst>
+                              <p:par>
+                                <p:cTn id="5" presetID="2" presetClass="entr" presetSubtype="4" fill="hold" grpId="0" nodeType="clickEffect">
+                                  <p:stCondLst>
+                                    <p:cond delay="0"/>
+                                  </p:stCondLst>
+                                  <p:childTnLst>
+                                    <p:set>
+                                      <p:cBhvr>
+                                        <p:cTn id="6" dur="1" fill="hold">
+                                          <p:stCondLst>
+                                            <p:cond delay="0"/>
+                                          </p:stCondLst>
+                                        </p:cTn>
+                                        <p:tgtEl>
+                                          <p:spTgt spid="17"/>
+                                        </p:tgtEl>
+                                        <p:attrNameLst>
+                                          <p:attrName>style.visibility</p:attrName>
+                                        </p:attrNameLst>
+                                      </p:cBhvr>
+                                      <p:to>
+                                        <p:strVal val="visible"/>
+                                      </p:to>
+                                    </p:set>
+                                    <p:anim calcmode="lin" valueType="num">
+                                      <p:cBhvr additive="base">
+                                        <p:cTn id="7" dur="500" fill="hold"/>
+                                        <p:tgtEl>
+                                          <p:spTgt spid="17"/>
+                                        </p:tgtEl>
+                                        <p:attrNameLst>
+                                          <p:attrName>ppt_x</p:attrName>
+                                        </p:attrNameLst>
+                                      </p:cBhvr>
+                                      <p:tavLst>
+                                        <p:tav tm="0">
+                                          <p:val>
+                                            <p:strVal val="#ppt_x"/>
+                                          </p:val>
+                                        </p:tav>
+                                        <p:tav tm="100000">
+                                          <p:val>
+                                            <p:strVal val="#ppt_x"/>
+                                          </p:val>
+                                        </p:tav>
+                                      </p:tavLst>
+                                    </p:anim>
+                                    <p:anim calcmode="lin" valueType="num">
+                                      <p:cBhvr additive="base">
+                                        <p:cTn id="8" dur="500" fill="hold"/>
+                                        <p:tgtEl>
+                                          <p:spTgt spid="17"/>
+                                        </p:tgtEl>
+                                        <p:attrNameLst>
+                                          <p:attrName>ppt_y</p:attrName>
+                                        </p:attrNameLst>
+                                      </p:cBhvr>
+                                      <p:tavLst>
+                                        <p:tav tm="0">
+                                          <p:val>
+                                            <p:strVal val="1+#ppt_h/2"/>
+                                          </p:val>
+                                        </p:tav>
+                                        <p:tav tm="100000">
+                                          <p:val>
+                                            <p:strVal val="#ppt_y"/>
+                                          </p:val>
+                                        </p:tav>
+                                      </p:tavLst>
+                                    </p:anim>
+                                  </p:childTnLst>
+                                </p:cTn>
+                              </p:par>
+                            </p:childTnLst>
+                          </p:cTn>
+                        </p:par>
+                      </p:childTnLst>
+                    </p:cTn>
+                  </p:par>
+                  <p:par>
+                    <p:cTn id="9" fill="hold">
+                      <p:stCondLst>
+                        <p:cond delay="indefinite"/>
+                      </p:stCondLst>
+                      <p:childTnLst>
+                        <p:par>
+                          <p:cTn id="10" fill="hold">
+                            <p:stCondLst>
+                              <p:cond delay="0"/>
+                            </p:stCondLst>
+                            <p:childTnLst>
+                              <p:par>
+                                <p:cTn id="11" presetID="10" presetClass="entr" presetSubtype="0" fill="hold" nodeType="clickEffect">
+                                  <p:stCondLst>
+                                    <p:cond delay="0"/>
+                                  </p:stCondLst>
+                                  <p:childTnLst>
+                                    <p:set>
+                                      <p:cBhvr>
+                                        <p:cTn id="12" dur="1" fill="hold">
+                                          <p:stCondLst>
+                                            <p:cond delay="0"/>
+                                          </p:stCondLst>
+                                        </p:cTn>
+                                        <p:tgtEl>
+                                          <p:spTgt spid="43"/>
+                                        </p:tgtEl>
+                                        <p:attrNameLst>
+                                          <p:attrName>style.visibility</p:attrName>
+                                        </p:attrNameLst>
+                                      </p:cBhvr>
+                                      <p:to>
+                                        <p:strVal val="visible"/>
+                                      </p:to>
+                                    </p:set>
+                                    <p:animEffect transition="in" filter="fade">
+                                      <p:cBhvr>
+                                        <p:cTn id="13" dur="500"/>
+                                        <p:tgtEl>
+                                          <p:spTgt spid="43"/>
+                                        </p:tgtEl>
+                                      </p:cBhvr>
+                                    </p:animEffect>
+                                  </p:childTnLst>
+                                </p:cTn>
+                              </p:par>
+                            </p:childTnLst>
+                          </p:cTn>
+                        </p:par>
+                      </p:childTnLst>
+                    </p:cTn>
+                  </p:par>
+                  <p:par>
+                    <p:cTn id="14" fill="hold">
+                      <p:stCondLst>
+                        <p:cond delay="indefinite"/>
+                      </p:stCondLst>
+                      <p:childTnLst>
+                        <p:par>
+                          <p:cTn id="15" fill="hold">
+                            <p:stCondLst>
+                              <p:cond delay="0"/>
+                            </p:stCondLst>
+                            <p:childTnLst>
+                              <p:par>
+                                <p:cTn id="16" presetID="10" presetClass="entr" presetSubtype="0" fill="hold" grpId="0" nodeType="clickEffect">
+                                  <p:stCondLst>
+                                    <p:cond delay="0"/>
+                                  </p:stCondLst>
+                                  <p:childTnLst>
+                                    <p:set>
+                                      <p:cBhvr>
+                                        <p:cTn id="17" dur="1" fill="hold">
+                                          <p:stCondLst>
+                                            <p:cond delay="0"/>
+                                          </p:stCondLst>
+                                        </p:cTn>
+                                        <p:tgtEl>
+                                          <p:spTgt spid="3"/>
+                                        </p:tgtEl>
+                                        <p:attrNameLst>
+                                          <p:attrName>style.visibility</p:attrName>
+                                        </p:attrNameLst>
+                                      </p:cBhvr>
+                                      <p:to>
+                                        <p:strVal val="visible"/>
+                                      </p:to>
+                                    </p:set>
+                                    <p:animEffect transition="in" filter="fade">
+                                      <p:cBhvr>
+                                        <p:cTn id="18" dur="500"/>
+                                        <p:tgtEl>
+                                          <p:spTgt spid="3"/>
+                                        </p:tgtEl>
+                                      </p:cBhvr>
+                                    </p:animEffect>
+                                  </p:childTnLst>
+                                </p:cTn>
+                              </p:par>
+                            </p:childTnLst>
+                          </p:cTn>
+                        </p:par>
+                      </p:childTnLst>
+                    </p:cTn>
+                  </p:par>
+                </p:childTnLst>
+              </p:cTn>
+              <p:prevCondLst>
+                <p:cond evt="onPrev" delay="0">
+                  <p:tgtEl>
+                    <p:sldTgt/>
+                  </p:tgtEl>
+                </p:cond>
+              </p:prevCondLst>
+              <p:nextCondLst>
+                <p:cond evt="onNext" delay="0">
+                  <p:tgtEl>
+                    <p:sldTgt/>
+                  </p:tgtEl>
+                </p:cond>
+              </p:nextCondLst>
+            </p:seq>
+          </p:childTnLst>
+        </p:cTn>
+      </p:par>
+    </p:tnLst>
+    <p:bldLst>
+      <p:bldP spid="17" grpId="0"/>
+      <p:bldP spid="3" grpId="0" animBg="1"/>
+    </p:bldLst>
+  </p:timing>
+</p:sld>
+</file>
+
+<file path=ppt/slides/slide12.xml><?xml version="1.0" encoding="utf-8"?>
+<p:sld xmlns:a="http://schemas.openxmlformats.org/drawingml/2006/main" xmlns:r="http://schemas.openxmlformats.org/officeDocument/2006/relationships" xmlns:p="http://schemas.openxmlformats.org/presentationml/2006/main">
+  <p:cSld>
+    <p:spTree>
+      <p:nvGrpSpPr>
+        <p:cNvPr id="1" name=""/>
+        <p:cNvGrpSpPr/>
+        <p:nvPr/>
+      </p:nvGrpSpPr>
+      <p:grpSpPr>
+        <a:xfrm>
+          <a:off x="0" y="0"/>
+          <a:ext cx="0" cy="0"/>
+          <a:chOff x="0" y="0"/>
+          <a:chExt cx="0" cy="0"/>
+        </a:xfrm>
+      </p:grpSpPr>
+      <p:sp>
+        <p:nvSpPr>
+          <p:cNvPr id="4" name="Title 3"/>
+          <p:cNvSpPr>
+            <a:spLocks noGrp="1"/>
+          </p:cNvSpPr>
+          <p:nvPr>
+            <p:ph type="title"/>
+          </p:nvPr>
+        </p:nvSpPr>
+        <p:spPr>
+          <a:xfrm>
+            <a:off x="380999" y="170129"/>
+            <a:ext cx="7016194" cy="763525"/>
+          </a:xfrm>
+        </p:spPr>
         <p:txBody>
           <a:bodyPr>
             <a:normAutofit/>
@@ -5867,7 +7008,7 @@
           <a:p>
             <a:r>
               <a:rPr lang="en-US" dirty="0"/>
-              <a:t>How it Works</a:t>
+              <a:t>How it all works together</a:t>
             </a:r>
           </a:p>
         </p:txBody>
@@ -7488,16 +8629,6 @@
               <a:t>which executes the line  </a:t>
             </a:r>
             <a:r>
-              <a:rPr lang="en-US" sz="1200" b="1" dirty="0" err="1">
-                <a:solidFill>
-                  <a:srgbClr val="C00000"/>
-                </a:solidFill>
-                <a:latin typeface="Courier New" panose="02070309020205020404" pitchFamily="49" charset="0"/>
-                <a:cs typeface="Courier New" panose="02070309020205020404" pitchFamily="49" charset="0"/>
-              </a:rPr>
-              <a:t>digitalWrite</a:t>
-            </a:r>
-            <a:r>
               <a:rPr lang="en-US" sz="1200" b="1" dirty="0">
                 <a:solidFill>
                   <a:srgbClr val="C00000"/>
@@ -7505,7 +8636,7 @@
                 <a:latin typeface="Courier New" panose="02070309020205020404" pitchFamily="49" charset="0"/>
                 <a:cs typeface="Courier New" panose="02070309020205020404" pitchFamily="49" charset="0"/>
               </a:rPr>
-              <a:t>(_pin, _state)</a:t>
+              <a:t>digitalWrite(_pin, _state)</a:t>
             </a:r>
           </a:p>
           <a:p>
@@ -8072,702 +9203,7 @@
 </p:sld>
 </file>
 
-<file path=ppt/slides/slide11.xml><?xml version="1.0" encoding="utf-8"?>
-<p:sld xmlns:a="http://schemas.openxmlformats.org/drawingml/2006/main" xmlns:r="http://schemas.openxmlformats.org/officeDocument/2006/relationships" xmlns:p="http://schemas.openxmlformats.org/presentationml/2006/main">
-  <p:cSld>
-    <p:spTree>
-      <p:nvGrpSpPr>
-        <p:cNvPr id="1" name=""/>
-        <p:cNvGrpSpPr/>
-        <p:nvPr/>
-      </p:nvGrpSpPr>
-      <p:grpSpPr>
-        <a:xfrm>
-          <a:off x="0" y="0"/>
-          <a:ext cx="0" cy="0"/>
-          <a:chOff x="0" y="0"/>
-          <a:chExt cx="0" cy="0"/>
-        </a:xfrm>
-      </p:grpSpPr>
-      <p:sp>
-        <p:nvSpPr>
-          <p:cNvPr id="4" name="Title 3"/>
-          <p:cNvSpPr>
-            <a:spLocks noGrp="1"/>
-          </p:cNvSpPr>
-          <p:nvPr>
-            <p:ph type="title"/>
-          </p:nvPr>
-        </p:nvSpPr>
-        <p:spPr>
-          <a:xfrm>
-            <a:off x="378103" y="134887"/>
-            <a:ext cx="7016194" cy="552290"/>
-          </a:xfrm>
-        </p:spPr>
-        <p:txBody>
-          <a:bodyPr>
-            <a:normAutofit fontScale="90000"/>
-          </a:bodyPr>
-          <a:lstStyle/>
-          <a:p>
-            <a:r>
-              <a:rPr lang="en-US" dirty="0"/>
-              <a:t>Under the Covers : the </a:t>
-            </a:r>
-            <a:r>
-              <a:rPr lang="en-US" dirty="0">
-                <a:solidFill>
-                  <a:srgbClr val="5EEC3C"/>
-                </a:solidFill>
-              </a:rPr>
-              <a:t>on() </a:t>
-            </a:r>
-            <a:r>
-              <a:rPr lang="en-US" dirty="0"/>
-              <a:t>property</a:t>
-            </a:r>
-          </a:p>
-        </p:txBody>
-      </p:sp>
-      <p:sp>
-        <p:nvSpPr>
-          <p:cNvPr id="2" name="Flowchart: Card 1">
-            <a:extLst>
-              <a:ext uri="{FF2B5EF4-FFF2-40B4-BE49-F238E27FC236}">
-                <a16:creationId xmlns:a16="http://schemas.microsoft.com/office/drawing/2014/main" id="{D28882D0-34A9-4243-A02D-162E9AC1F25A}"/>
-              </a:ext>
-            </a:extLst>
-          </p:cNvPr>
-          <p:cNvSpPr/>
-          <p:nvPr/>
-        </p:nvSpPr>
-        <p:spPr>
-          <a:xfrm>
-            <a:off x="2802592" y="1142000"/>
-            <a:ext cx="1905000" cy="1074674"/>
-          </a:xfrm>
-          <a:prstGeom prst="flowChartPunchedCard">
-            <a:avLst/>
-          </a:prstGeom>
-        </p:spPr>
-        <p:style>
-          <a:lnRef idx="2">
-            <a:schemeClr val="accent1">
-              <a:shade val="50000"/>
-            </a:schemeClr>
-          </a:lnRef>
-          <a:fillRef idx="1">
-            <a:schemeClr val="accent1"/>
-          </a:fillRef>
-          <a:effectRef idx="0">
-            <a:schemeClr val="accent1"/>
-          </a:effectRef>
-          <a:fontRef idx="minor">
-            <a:schemeClr val="lt1"/>
-          </a:fontRef>
-        </p:style>
-        <p:txBody>
-          <a:bodyPr rtlCol="0" anchor="ctr"/>
-          <a:lstStyle/>
-          <a:p>
-            <a:pPr algn="ctr"/>
-            <a:r>
-              <a:rPr lang="en-US" dirty="0"/>
-              <a:t>LED2 Class</a:t>
-            </a:r>
-          </a:p>
-        </p:txBody>
-      </p:sp>
-      <p:grpSp>
-        <p:nvGrpSpPr>
-          <p:cNvPr id="13" name="Group 12">
-            <a:extLst>
-              <a:ext uri="{FF2B5EF4-FFF2-40B4-BE49-F238E27FC236}">
-                <a16:creationId xmlns:a16="http://schemas.microsoft.com/office/drawing/2014/main" id="{7FD52B14-EFFC-4063-A6BD-6A39F416055E}"/>
-              </a:ext>
-            </a:extLst>
-          </p:cNvPr>
-          <p:cNvGrpSpPr/>
-          <p:nvPr/>
-        </p:nvGrpSpPr>
-        <p:grpSpPr>
-          <a:xfrm>
-            <a:off x="1295400" y="1220627"/>
-            <a:ext cx="1600200" cy="311956"/>
-            <a:chOff x="1200150" y="1573994"/>
-            <a:chExt cx="1600200" cy="311956"/>
-          </a:xfrm>
-        </p:grpSpPr>
-        <p:sp>
-          <p:nvSpPr>
-            <p:cNvPr id="11" name="Arrow: Right 10">
-              <a:extLst>
-                <a:ext uri="{FF2B5EF4-FFF2-40B4-BE49-F238E27FC236}">
-                  <a16:creationId xmlns:a16="http://schemas.microsoft.com/office/drawing/2014/main" id="{2E2972D8-57E5-4E8E-9D3C-C2059DADAB64}"/>
-                </a:ext>
-              </a:extLst>
-            </p:cNvPr>
-            <p:cNvSpPr/>
-            <p:nvPr/>
-          </p:nvSpPr>
-          <p:spPr>
-            <a:xfrm>
-              <a:off x="1295400" y="1777937"/>
-              <a:ext cx="1371600" cy="108013"/>
-            </a:xfrm>
-            <a:prstGeom prst="rightArrow">
-              <a:avLst/>
-            </a:prstGeom>
-          </p:spPr>
-          <p:style>
-            <a:lnRef idx="2">
-              <a:schemeClr val="accent3">
-                <a:shade val="50000"/>
-              </a:schemeClr>
-            </a:lnRef>
-            <a:fillRef idx="1">
-              <a:schemeClr val="accent3"/>
-            </a:fillRef>
-            <a:effectRef idx="0">
-              <a:schemeClr val="accent3"/>
-            </a:effectRef>
-            <a:fontRef idx="minor">
-              <a:schemeClr val="lt1"/>
-            </a:fontRef>
-          </p:style>
-          <p:txBody>
-            <a:bodyPr rtlCol="0" anchor="ctr"/>
-            <a:lstStyle/>
-            <a:p>
-              <a:pPr algn="ctr"/>
-              <a:endParaRPr lang="en-US"/>
-            </a:p>
-          </p:txBody>
-        </p:sp>
-        <p:sp>
-          <p:nvSpPr>
-            <p:cNvPr id="12" name="TextBox 11">
-              <a:extLst>
-                <a:ext uri="{FF2B5EF4-FFF2-40B4-BE49-F238E27FC236}">
-                  <a16:creationId xmlns:a16="http://schemas.microsoft.com/office/drawing/2014/main" id="{0EBC5A7F-2651-44EE-9BCC-86D9068972AA}"/>
-                </a:ext>
-              </a:extLst>
-            </p:cNvPr>
-            <p:cNvSpPr txBox="1"/>
-            <p:nvPr/>
-          </p:nvSpPr>
-          <p:spPr>
-            <a:xfrm>
-              <a:off x="1200150" y="1573994"/>
-              <a:ext cx="1600200" cy="276999"/>
-            </a:xfrm>
-            <a:prstGeom prst="rect">
-              <a:avLst/>
-            </a:prstGeom>
-            <a:noFill/>
-          </p:spPr>
-          <p:txBody>
-            <a:bodyPr wrap="square" rtlCol="0">
-              <a:spAutoFit/>
-            </a:bodyPr>
-            <a:lstStyle/>
-            <a:p>
-              <a:r>
-                <a:rPr lang="en-US" sz="1200" dirty="0"/>
-                <a:t>“on” Command</a:t>
-              </a:r>
-            </a:p>
-          </p:txBody>
-        </p:sp>
-      </p:grpSp>
-      <p:sp>
-        <p:nvSpPr>
-          <p:cNvPr id="17" name="TextBox 16">
-            <a:extLst>
-              <a:ext uri="{FF2B5EF4-FFF2-40B4-BE49-F238E27FC236}">
-                <a16:creationId xmlns:a16="http://schemas.microsoft.com/office/drawing/2014/main" id="{663BA15D-FD0A-4A2D-B956-2CD35EABA77D}"/>
-              </a:ext>
-            </a:extLst>
-          </p:cNvPr>
-          <p:cNvSpPr txBox="1"/>
-          <p:nvPr/>
-        </p:nvSpPr>
-        <p:spPr>
-          <a:xfrm>
-            <a:off x="609600" y="2527088"/>
-            <a:ext cx="3429000" cy="307777"/>
-          </a:xfrm>
-          <a:prstGeom prst="rect">
-            <a:avLst/>
-          </a:prstGeom>
-          <a:noFill/>
-        </p:spPr>
-        <p:txBody>
-          <a:bodyPr wrap="square" rtlCol="0">
-            <a:spAutoFit/>
-          </a:bodyPr>
-          <a:lstStyle/>
-          <a:p>
-            <a:r>
-              <a:rPr lang="en-US" sz="1400" b="1" dirty="0">
-                <a:solidFill>
-                  <a:srgbClr val="00B050"/>
-                </a:solidFill>
-                <a:latin typeface="Courier New" panose="02070309020205020404" pitchFamily="49" charset="0"/>
-                <a:cs typeface="Courier New" panose="02070309020205020404" pitchFamily="49" charset="0"/>
-              </a:rPr>
-              <a:t>myLed1.on();</a:t>
-            </a:r>
-          </a:p>
-        </p:txBody>
-      </p:sp>
-      <p:grpSp>
-        <p:nvGrpSpPr>
-          <p:cNvPr id="43" name="Group 42">
-            <a:extLst>
-              <a:ext uri="{FF2B5EF4-FFF2-40B4-BE49-F238E27FC236}">
-                <a16:creationId xmlns:a16="http://schemas.microsoft.com/office/drawing/2014/main" id="{93D2071D-53D8-4A20-B30D-4686B50120F7}"/>
-              </a:ext>
-            </a:extLst>
-          </p:cNvPr>
-          <p:cNvGrpSpPr/>
-          <p:nvPr/>
-        </p:nvGrpSpPr>
-        <p:grpSpPr>
-          <a:xfrm>
-            <a:off x="189062" y="2838771"/>
-            <a:ext cx="7394275" cy="1828310"/>
-            <a:chOff x="189062" y="2838771"/>
-            <a:chExt cx="7394275" cy="1828310"/>
-          </a:xfrm>
-        </p:grpSpPr>
-        <p:sp>
-          <p:nvSpPr>
-            <p:cNvPr id="41" name="TextBox 40">
-              <a:extLst>
-                <a:ext uri="{FF2B5EF4-FFF2-40B4-BE49-F238E27FC236}">
-                  <a16:creationId xmlns:a16="http://schemas.microsoft.com/office/drawing/2014/main" id="{EE2C6F95-F2D7-4B6D-AA71-8D7B5504F3CF}"/>
-                </a:ext>
-              </a:extLst>
-            </p:cNvPr>
-            <p:cNvSpPr txBox="1"/>
-            <p:nvPr/>
-          </p:nvSpPr>
-          <p:spPr>
-            <a:xfrm>
-              <a:off x="189062" y="3897640"/>
-              <a:ext cx="7394275" cy="769441"/>
-            </a:xfrm>
-            <a:prstGeom prst="rect">
-              <a:avLst/>
-            </a:prstGeom>
-            <a:noFill/>
-          </p:spPr>
-          <p:txBody>
-            <a:bodyPr wrap="square" rtlCol="0">
-              <a:spAutoFit/>
-            </a:bodyPr>
-            <a:lstStyle/>
-            <a:p>
-              <a:r>
-                <a:rPr lang="en-US" sz="1100" dirty="0">
-                  <a:latin typeface="Courier New" panose="02070309020205020404" pitchFamily="49" charset="0"/>
-                  <a:cs typeface="Courier New" panose="02070309020205020404" pitchFamily="49" charset="0"/>
-                </a:rPr>
-                <a:t>void Led2::on() {</a:t>
-              </a:r>
-            </a:p>
-            <a:p>
-              <a:r>
-                <a:rPr lang="en-US" sz="1100" dirty="0">
-                  <a:latin typeface="Courier New" panose="02070309020205020404" pitchFamily="49" charset="0"/>
-                  <a:cs typeface="Courier New" panose="02070309020205020404" pitchFamily="49" charset="0"/>
-                </a:rPr>
-                <a:t>  _blink = false; // Turn off blink mode</a:t>
-              </a:r>
-            </a:p>
-            <a:p>
-              <a:r>
-                <a:rPr lang="en-US" sz="1100" dirty="0">
-                  <a:latin typeface="Courier New" panose="02070309020205020404" pitchFamily="49" charset="0"/>
-                  <a:cs typeface="Courier New" panose="02070309020205020404" pitchFamily="49" charset="0"/>
-                </a:rPr>
-                <a:t>  _state = HIGH;  // Set desired state LED will turn on with next call to update</a:t>
-              </a:r>
-            </a:p>
-            <a:p>
-              <a:r>
-                <a:rPr lang="en-US" sz="1100" dirty="0">
-                  <a:latin typeface="Courier New" panose="02070309020205020404" pitchFamily="49" charset="0"/>
-                  <a:cs typeface="Courier New" panose="02070309020205020404" pitchFamily="49" charset="0"/>
-                </a:rPr>
-                <a:t>}</a:t>
-              </a:r>
-            </a:p>
-          </p:txBody>
-        </p:sp>
-        <p:sp>
-          <p:nvSpPr>
-            <p:cNvPr id="42" name="Arrow: Curved Left 41">
-              <a:extLst>
-                <a:ext uri="{FF2B5EF4-FFF2-40B4-BE49-F238E27FC236}">
-                  <a16:creationId xmlns:a16="http://schemas.microsoft.com/office/drawing/2014/main" id="{FD39DF94-F2B7-4A9B-89CA-C643FC828426}"/>
-                </a:ext>
-              </a:extLst>
-            </p:cNvPr>
-            <p:cNvSpPr/>
-            <p:nvPr/>
-          </p:nvSpPr>
-          <p:spPr>
-            <a:xfrm rot="682364">
-              <a:off x="1757391" y="2838771"/>
-              <a:ext cx="304800" cy="1064500"/>
-            </a:xfrm>
-            <a:prstGeom prst="curvedLeftArrow">
-              <a:avLst/>
-            </a:prstGeom>
-            <a:solidFill>
-              <a:srgbClr val="5EEC3C"/>
-            </a:solidFill>
-          </p:spPr>
-          <p:style>
-            <a:lnRef idx="2">
-              <a:schemeClr val="accent1">
-                <a:shade val="50000"/>
-              </a:schemeClr>
-            </a:lnRef>
-            <a:fillRef idx="1">
-              <a:schemeClr val="accent1"/>
-            </a:fillRef>
-            <a:effectRef idx="0">
-              <a:schemeClr val="accent1"/>
-            </a:effectRef>
-            <a:fontRef idx="minor">
-              <a:schemeClr val="lt1"/>
-            </a:fontRef>
-          </p:style>
-          <p:txBody>
-            <a:bodyPr rtlCol="0" anchor="ctr"/>
-            <a:lstStyle/>
-            <a:p>
-              <a:pPr algn="ctr"/>
-              <a:endParaRPr lang="en-US">
-                <a:solidFill>
-                  <a:schemeClr val="tx1"/>
-                </a:solidFill>
-              </a:endParaRPr>
-            </a:p>
-          </p:txBody>
-        </p:sp>
-      </p:grpSp>
-      <p:sp>
-        <p:nvSpPr>
-          <p:cNvPr id="3" name="Speech Bubble: Oval 2">
-            <a:extLst>
-              <a:ext uri="{FF2B5EF4-FFF2-40B4-BE49-F238E27FC236}">
-                <a16:creationId xmlns:a16="http://schemas.microsoft.com/office/drawing/2014/main" id="{31A1C3FC-8999-49B6-A2F0-5A278E7522BD}"/>
-              </a:ext>
-            </a:extLst>
-          </p:cNvPr>
-          <p:cNvSpPr/>
-          <p:nvPr/>
-        </p:nvSpPr>
-        <p:spPr>
-          <a:xfrm>
-            <a:off x="2590800" y="2527088"/>
-            <a:ext cx="4897772" cy="1103704"/>
-          </a:xfrm>
-          <a:prstGeom prst="wedgeEllipseCallout">
-            <a:avLst>
-              <a:gd name="adj1" fmla="val -61379"/>
-              <a:gd name="adj2" fmla="val 77729"/>
-            </a:avLst>
-          </a:prstGeom>
-          <a:solidFill>
-            <a:schemeClr val="accent3">
-              <a:lumMod val="20000"/>
-              <a:lumOff val="80000"/>
-            </a:schemeClr>
-          </a:solidFill>
-        </p:spPr>
-        <p:style>
-          <a:lnRef idx="2">
-            <a:schemeClr val="accent1">
-              <a:shade val="50000"/>
-            </a:schemeClr>
-          </a:lnRef>
-          <a:fillRef idx="1">
-            <a:schemeClr val="accent1"/>
-          </a:fillRef>
-          <a:effectRef idx="0">
-            <a:schemeClr val="accent1"/>
-          </a:effectRef>
-          <a:fontRef idx="minor">
-            <a:schemeClr val="lt1"/>
-          </a:fontRef>
-        </p:style>
-        <p:txBody>
-          <a:bodyPr rtlCol="0" anchor="ctr"/>
-          <a:lstStyle/>
-          <a:p>
-            <a:pPr algn="ctr"/>
-            <a:r>
-              <a:rPr lang="en-US" dirty="0">
-                <a:solidFill>
-                  <a:schemeClr val="tx1"/>
-                </a:solidFill>
-              </a:rPr>
-              <a:t>On() is a function within the class definition that sets some of the private internal variables.</a:t>
-            </a:r>
-          </a:p>
-        </p:txBody>
-      </p:sp>
-    </p:spTree>
-    <p:extLst>
-      <p:ext uri="{BB962C8B-B14F-4D97-AF65-F5344CB8AC3E}">
-        <p14:creationId xmlns:p14="http://schemas.microsoft.com/office/powerpoint/2010/main" val="2353939467"/>
-      </p:ext>
-    </p:extLst>
-  </p:cSld>
-  <p:clrMapOvr>
-    <a:masterClrMapping/>
-  </p:clrMapOvr>
-  <p:timing>
-    <p:tnLst>
-      <p:par>
-        <p:cTn id="1" dur="indefinite" restart="never" nodeType="tmRoot">
-          <p:childTnLst>
-            <p:seq concurrent="1" nextAc="seek">
-              <p:cTn id="2" dur="indefinite" nodeType="mainSeq">
-                <p:childTnLst>
-                  <p:par>
-                    <p:cTn id="3" fill="hold">
-                      <p:stCondLst>
-                        <p:cond delay="indefinite"/>
-                      </p:stCondLst>
-                      <p:childTnLst>
-                        <p:par>
-                          <p:cTn id="4" fill="hold">
-                            <p:stCondLst>
-                              <p:cond delay="0"/>
-                            </p:stCondLst>
-                            <p:childTnLst>
-                              <p:par>
-                                <p:cTn id="5" presetID="2" presetClass="entr" presetSubtype="4" fill="hold" grpId="0" nodeType="clickEffect">
-                                  <p:stCondLst>
-                                    <p:cond delay="0"/>
-                                  </p:stCondLst>
-                                  <p:childTnLst>
-                                    <p:set>
-                                      <p:cBhvr>
-                                        <p:cTn id="6" dur="1" fill="hold">
-                                          <p:stCondLst>
-                                            <p:cond delay="0"/>
-                                          </p:stCondLst>
-                                        </p:cTn>
-                                        <p:tgtEl>
-                                          <p:spTgt spid="17"/>
-                                        </p:tgtEl>
-                                        <p:attrNameLst>
-                                          <p:attrName>style.visibility</p:attrName>
-                                        </p:attrNameLst>
-                                      </p:cBhvr>
-                                      <p:to>
-                                        <p:strVal val="visible"/>
-                                      </p:to>
-                                    </p:set>
-                                    <p:anim calcmode="lin" valueType="num">
-                                      <p:cBhvr additive="base">
-                                        <p:cTn id="7" dur="500" fill="hold"/>
-                                        <p:tgtEl>
-                                          <p:spTgt spid="17"/>
-                                        </p:tgtEl>
-                                        <p:attrNameLst>
-                                          <p:attrName>ppt_x</p:attrName>
-                                        </p:attrNameLst>
-                                      </p:cBhvr>
-                                      <p:tavLst>
-                                        <p:tav tm="0">
-                                          <p:val>
-                                            <p:strVal val="#ppt_x"/>
-                                          </p:val>
-                                        </p:tav>
-                                        <p:tav tm="100000">
-                                          <p:val>
-                                            <p:strVal val="#ppt_x"/>
-                                          </p:val>
-                                        </p:tav>
-                                      </p:tavLst>
-                                    </p:anim>
-                                    <p:anim calcmode="lin" valueType="num">
-                                      <p:cBhvr additive="base">
-                                        <p:cTn id="8" dur="500" fill="hold"/>
-                                        <p:tgtEl>
-                                          <p:spTgt spid="17"/>
-                                        </p:tgtEl>
-                                        <p:attrNameLst>
-                                          <p:attrName>ppt_y</p:attrName>
-                                        </p:attrNameLst>
-                                      </p:cBhvr>
-                                      <p:tavLst>
-                                        <p:tav tm="0">
-                                          <p:val>
-                                            <p:strVal val="1+#ppt_h/2"/>
-                                          </p:val>
-                                        </p:tav>
-                                        <p:tav tm="100000">
-                                          <p:val>
-                                            <p:strVal val="#ppt_y"/>
-                                          </p:val>
-                                        </p:tav>
-                                      </p:tavLst>
-                                    </p:anim>
-                                  </p:childTnLst>
-                                </p:cTn>
-                              </p:par>
-                            </p:childTnLst>
-                          </p:cTn>
-                        </p:par>
-                      </p:childTnLst>
-                    </p:cTn>
-                  </p:par>
-                  <p:par>
-                    <p:cTn id="9" fill="hold">
-                      <p:stCondLst>
-                        <p:cond delay="indefinite"/>
-                      </p:stCondLst>
-                      <p:childTnLst>
-                        <p:par>
-                          <p:cTn id="10" fill="hold">
-                            <p:stCondLst>
-                              <p:cond delay="0"/>
-                            </p:stCondLst>
-                            <p:childTnLst>
-                              <p:par>
-                                <p:cTn id="11" presetID="10" presetClass="entr" presetSubtype="0" fill="hold" nodeType="clickEffect">
-                                  <p:stCondLst>
-                                    <p:cond delay="0"/>
-                                  </p:stCondLst>
-                                  <p:childTnLst>
-                                    <p:set>
-                                      <p:cBhvr>
-                                        <p:cTn id="12" dur="1" fill="hold">
-                                          <p:stCondLst>
-                                            <p:cond delay="0"/>
-                                          </p:stCondLst>
-                                        </p:cTn>
-                                        <p:tgtEl>
-                                          <p:spTgt spid="43"/>
-                                        </p:tgtEl>
-                                        <p:attrNameLst>
-                                          <p:attrName>style.visibility</p:attrName>
-                                        </p:attrNameLst>
-                                      </p:cBhvr>
-                                      <p:to>
-                                        <p:strVal val="visible"/>
-                                      </p:to>
-                                    </p:set>
-                                    <p:animEffect transition="in" filter="fade">
-                                      <p:cBhvr>
-                                        <p:cTn id="13" dur="500"/>
-                                        <p:tgtEl>
-                                          <p:spTgt spid="43"/>
-                                        </p:tgtEl>
-                                      </p:cBhvr>
-                                    </p:animEffect>
-                                  </p:childTnLst>
-                                </p:cTn>
-                              </p:par>
-                            </p:childTnLst>
-                          </p:cTn>
-                        </p:par>
-                      </p:childTnLst>
-                    </p:cTn>
-                  </p:par>
-                  <p:par>
-                    <p:cTn id="14" fill="hold">
-                      <p:stCondLst>
-                        <p:cond delay="indefinite"/>
-                      </p:stCondLst>
-                      <p:childTnLst>
-                        <p:par>
-                          <p:cTn id="15" fill="hold">
-                            <p:stCondLst>
-                              <p:cond delay="0"/>
-                            </p:stCondLst>
-                            <p:childTnLst>
-                              <p:par>
-                                <p:cTn id="16" presetID="10" presetClass="entr" presetSubtype="0" fill="hold" grpId="0" nodeType="clickEffect">
-                                  <p:stCondLst>
-                                    <p:cond delay="0"/>
-                                  </p:stCondLst>
-                                  <p:childTnLst>
-                                    <p:set>
-                                      <p:cBhvr>
-                                        <p:cTn id="17" dur="1" fill="hold">
-                                          <p:stCondLst>
-                                            <p:cond delay="0"/>
-                                          </p:stCondLst>
-                                        </p:cTn>
-                                        <p:tgtEl>
-                                          <p:spTgt spid="3"/>
-                                        </p:tgtEl>
-                                        <p:attrNameLst>
-                                          <p:attrName>style.visibility</p:attrName>
-                                        </p:attrNameLst>
-                                      </p:cBhvr>
-                                      <p:to>
-                                        <p:strVal val="visible"/>
-                                      </p:to>
-                                    </p:set>
-                                    <p:animEffect transition="in" filter="fade">
-                                      <p:cBhvr>
-                                        <p:cTn id="18" dur="500"/>
-                                        <p:tgtEl>
-                                          <p:spTgt spid="3"/>
-                                        </p:tgtEl>
-                                      </p:cBhvr>
-                                    </p:animEffect>
-                                  </p:childTnLst>
-                                </p:cTn>
-                              </p:par>
-                            </p:childTnLst>
-                          </p:cTn>
-                        </p:par>
-                      </p:childTnLst>
-                    </p:cTn>
-                  </p:par>
-                </p:childTnLst>
-              </p:cTn>
-              <p:prevCondLst>
-                <p:cond evt="onPrev" delay="0">
-                  <p:tgtEl>
-                    <p:sldTgt/>
-                  </p:tgtEl>
-                </p:cond>
-              </p:prevCondLst>
-              <p:nextCondLst>
-                <p:cond evt="onNext" delay="0">
-                  <p:tgtEl>
-                    <p:sldTgt/>
-                  </p:tgtEl>
-                </p:cond>
-              </p:nextCondLst>
-            </p:seq>
-          </p:childTnLst>
-        </p:cTn>
-      </p:par>
-    </p:tnLst>
-    <p:bldLst>
-      <p:bldP spid="17" grpId="0"/>
-      <p:bldP spid="3" grpId="0" animBg="1"/>
-    </p:bldLst>
-  </p:timing>
-</p:sld>
-</file>
-
-<file path=ppt/slides/slide12.xml><?xml version="1.0" encoding="utf-8"?>
+<file path=ppt/slides/slide13.xml><?xml version="1.0" encoding="utf-8"?>
 <p:sld xmlns:a="http://schemas.openxmlformats.org/drawingml/2006/main" xmlns:r="http://schemas.openxmlformats.org/officeDocument/2006/relationships" xmlns:p="http://schemas.openxmlformats.org/presentationml/2006/main">
   <p:cSld>
     <p:spTree>
@@ -9244,16 +9680,6 @@
               <a:t>       (We can do that much by writing directly to the output with   </a:t>
             </a:r>
             <a:r>
-              <a:rPr lang="en-US" sz="1100" b="1" dirty="0" err="1">
-                <a:solidFill>
-                  <a:srgbClr val="C00000"/>
-                </a:solidFill>
-                <a:latin typeface="Courier New" panose="02070309020205020404" pitchFamily="49" charset="0"/>
-                <a:cs typeface="Courier New" panose="02070309020205020404" pitchFamily="49" charset="0"/>
-              </a:rPr>
-              <a:t>digitalWrite</a:t>
-            </a:r>
-            <a:r>
               <a:rPr lang="en-US" sz="1100" b="1" dirty="0">
                 <a:solidFill>
                   <a:srgbClr val="C00000"/>
@@ -9261,7 +9687,7 @@
                 <a:latin typeface="Courier New" panose="02070309020205020404" pitchFamily="49" charset="0"/>
                 <a:cs typeface="Courier New" panose="02070309020205020404" pitchFamily="49" charset="0"/>
               </a:rPr>
-              <a:t>(13, HIGH) </a:t>
+              <a:t>digitalWrite(13, HIGH) </a:t>
             </a:r>
             <a:r>
               <a:rPr lang="en-US" sz="1400" dirty="0"/>
@@ -10840,7 +11266,7 @@
 </p:sld>
 </file>
 
-<file path=ppt/slides/slide13.xml><?xml version="1.0" encoding="utf-8"?>
+<file path=ppt/slides/slide14.xml><?xml version="1.0" encoding="utf-8"?>
 <p:sld xmlns:a="http://schemas.openxmlformats.org/drawingml/2006/main" xmlns:r="http://schemas.openxmlformats.org/officeDocument/2006/relationships" xmlns:p="http://schemas.openxmlformats.org/presentationml/2006/main">
   <p:cSld>
     <p:spTree>
@@ -11820,7 +12246,7 @@
 </p:sld>
 </file>
 
-<file path=ppt/slides/slide14.xml><?xml version="1.0" encoding="utf-8"?>
+<file path=ppt/slides/slide15.xml><?xml version="1.0" encoding="utf-8"?>
 <p:sld xmlns:a="http://schemas.openxmlformats.org/drawingml/2006/main" xmlns:r="http://schemas.openxmlformats.org/officeDocument/2006/relationships" xmlns:p="http://schemas.openxmlformats.org/presentationml/2006/main">
   <p:cSld>
     <p:spTree>
@@ -11861,7 +12287,7 @@
           <a:p>
             <a:r>
               <a:rPr lang="en-US" dirty="0"/>
-              <a:t>Going A little deeper ….</a:t>
+              <a:t>Going deeper with a code review….</a:t>
             </a:r>
           </a:p>
         </p:txBody>
@@ -11949,12 +12375,9 @@
             </a:r>
           </a:p>
           <a:p>
-            <a:endParaRPr lang="en-US" sz="2800" dirty="0"/>
-          </a:p>
-          <a:p>
             <a:r>
               <a:rPr lang="en-US" sz="2800" dirty="0"/>
-              <a:t> </a:t>
+              <a:t>Latest:  </a:t>
             </a:r>
             <a:r>
               <a:rPr lang="en-US" sz="2800" dirty="0">
@@ -11965,6 +12388,12 @@
             <a:r>
               <a:rPr lang="en-US" sz="2800" dirty="0"/>
               <a:t> </a:t>
+            </a:r>
+          </a:p>
+          <a:p>
+            <a:r>
+              <a:rPr lang="en-US" sz="2800" dirty="0"/>
+              <a:t>A snapshot also included later in this PPT.</a:t>
             </a:r>
           </a:p>
         </p:txBody>
@@ -12018,7 +12447,7 @@
 </p:sld>
 </file>
 
-<file path=ppt/slides/slide15.xml><?xml version="1.0" encoding="utf-8"?>
+<file path=ppt/slides/slide16.xml><?xml version="1.0" encoding="utf-8"?>
 <p:sld xmlns:a="http://schemas.openxmlformats.org/drawingml/2006/main" xmlns:r="http://schemas.openxmlformats.org/officeDocument/2006/relationships" xmlns:p="http://schemas.openxmlformats.org/presentationml/2006/main">
   <p:cSld>
     <p:spTree>
@@ -12226,7 +12655,7 @@
 </p:sld>
 </file>
 
-<file path=ppt/slides/slide16.xml><?xml version="1.0" encoding="utf-8"?>
+<file path=ppt/slides/slide17.xml><?xml version="1.0" encoding="utf-8"?>
 <p:sld xmlns:a="http://schemas.openxmlformats.org/drawingml/2006/main" xmlns:r="http://schemas.openxmlformats.org/officeDocument/2006/relationships" xmlns:p="http://schemas.openxmlformats.org/presentationml/2006/main">
   <p:cSld>
     <p:spTree>
@@ -12341,7 +12770,7 @@
                   <a:srgbClr val="00B050"/>
                 </a:solidFill>
               </a:rPr>
-              <a:t>Can be thought of as a user defined variable</a:t>
+              <a:t>A user defined variable type</a:t>
             </a:r>
           </a:p>
           <a:p>
@@ -12409,7 +12838,7 @@
 </p:sld>
 </file>
 
-<file path=ppt/slides/slide17.xml><?xml version="1.0" encoding="utf-8"?>
+<file path=ppt/slides/slide18.xml><?xml version="1.0" encoding="utf-8"?>
 <p:sld xmlns:a="http://schemas.openxmlformats.org/drawingml/2006/main" xmlns:r="http://schemas.openxmlformats.org/officeDocument/2006/relationships" xmlns:p="http://schemas.openxmlformats.org/presentationml/2006/main">
   <p:cSld>
     <p:spTree>
@@ -12537,7 +12966,7 @@
 </p:sld>
 </file>
 
-<file path=ppt/slides/slide18.xml><?xml version="1.0" encoding="utf-8"?>
+<file path=ppt/slides/slide19.xml><?xml version="1.0" encoding="utf-8"?>
 <p:sld xmlns:a="http://schemas.openxmlformats.org/drawingml/2006/main" xmlns:r="http://schemas.openxmlformats.org/officeDocument/2006/relationships" xmlns:p="http://schemas.openxmlformats.org/presentationml/2006/main">
   <p:cSld>
     <p:spTree>
@@ -12696,144 +13125,6 @@
 </p:sld>
 </file>
 
-<file path=ppt/slides/slide19.xml><?xml version="1.0" encoding="utf-8"?>
-<p:sld xmlns:a="http://schemas.openxmlformats.org/drawingml/2006/main" xmlns:r="http://schemas.openxmlformats.org/officeDocument/2006/relationships" xmlns:p="http://schemas.openxmlformats.org/presentationml/2006/main">
-  <p:cSld>
-    <p:spTree>
-      <p:nvGrpSpPr>
-        <p:cNvPr id="1" name=""/>
-        <p:cNvGrpSpPr/>
-        <p:nvPr/>
-      </p:nvGrpSpPr>
-      <p:grpSpPr>
-        <a:xfrm>
-          <a:off x="0" y="0"/>
-          <a:ext cx="0" cy="0"/>
-          <a:chOff x="0" y="0"/>
-          <a:chExt cx="0" cy="0"/>
-        </a:xfrm>
-      </p:grpSpPr>
-      <p:sp>
-        <p:nvSpPr>
-          <p:cNvPr id="4" name="Title 3"/>
-          <p:cNvSpPr>
-            <a:spLocks noGrp="1"/>
-          </p:cNvSpPr>
-          <p:nvPr>
-            <p:ph type="title"/>
-          </p:nvPr>
-        </p:nvSpPr>
-        <p:spPr/>
-        <p:txBody>
-          <a:bodyPr>
-            <a:normAutofit/>
-          </a:bodyPr>
-          <a:lstStyle/>
-          <a:p>
-            <a:r>
-              <a:rPr lang="en-US" dirty="0"/>
-              <a:t>Why Not use a Class?</a:t>
-            </a:r>
-          </a:p>
-        </p:txBody>
-      </p:sp>
-      <p:sp>
-        <p:nvSpPr>
-          <p:cNvPr id="5" name="Content Placeholder 4"/>
-          <p:cNvSpPr>
-            <a:spLocks noGrp="1"/>
-          </p:cNvSpPr>
-          <p:nvPr>
-            <p:ph idx="1"/>
-          </p:nvPr>
-        </p:nvSpPr>
-        <p:spPr/>
-        <p:txBody>
-          <a:bodyPr>
-            <a:normAutofit fontScale="92500" lnSpcReduction="10000"/>
-          </a:bodyPr>
-          <a:lstStyle/>
-          <a:p>
-            <a:r>
-              <a:rPr lang="en-US" sz="2400" dirty="0"/>
-              <a:t>For some applications they are not needed so why use a class to do what might be a trivial thing</a:t>
-            </a:r>
-          </a:p>
-          <a:p>
-            <a:r>
-              <a:rPr lang="en-US" sz="2400" dirty="0"/>
-              <a:t>Classes are still programs and programs do have bugs.</a:t>
-            </a:r>
-          </a:p>
-          <a:p>
-            <a:r>
-              <a:rPr lang="en-US" sz="2400" dirty="0"/>
-              <a:t>All that hidden complexity might represent a can of worms if you did not write the code but still need to dig into it.</a:t>
-            </a:r>
-          </a:p>
-          <a:p>
-            <a:r>
-              <a:rPr lang="en-US" sz="2400" dirty="0"/>
-              <a:t>There is a learning curve, especially if a class has lots of properties and methods.</a:t>
-            </a:r>
-          </a:p>
-          <a:p>
-            <a:r>
-              <a:rPr lang="en-US" sz="2400" dirty="0"/>
-              <a:t>Changing a class can have knock on effects to many programs that depend on it working a certain way</a:t>
-            </a:r>
-          </a:p>
-        </p:txBody>
-      </p:sp>
-      <p:pic>
-        <p:nvPicPr>
-          <p:cNvPr id="6" name="Picture 5">
-            <a:extLst>
-              <a:ext uri="{FF2B5EF4-FFF2-40B4-BE49-F238E27FC236}">
-                <a16:creationId xmlns:a16="http://schemas.microsoft.com/office/drawing/2014/main" id="{61FF043E-6FDA-432B-A008-FB89E7C32177}"/>
-              </a:ext>
-            </a:extLst>
-          </p:cNvPr>
-          <p:cNvPicPr>
-            <a:picLocks noChangeAspect="1"/>
-          </p:cNvPicPr>
-          <p:nvPr/>
-        </p:nvPicPr>
-        <p:blipFill>
-          <a:blip r:embed="rId3" cstate="print">
-            <a:extLst>
-              <a:ext uri="{28A0092B-C50C-407E-A947-70E740481C1C}">
-                <a14:useLocalDpi xmlns:a14="http://schemas.microsoft.com/office/drawing/2010/main" val="0"/>
-              </a:ext>
-            </a:extLst>
-          </a:blip>
-          <a:stretch>
-            <a:fillRect/>
-          </a:stretch>
-        </p:blipFill>
-        <p:spPr>
-          <a:xfrm>
-            <a:off x="7848600" y="4583336"/>
-            <a:ext cx="1028700" cy="457771"/>
-          </a:xfrm>
-          <a:prstGeom prst="rect">
-            <a:avLst/>
-          </a:prstGeom>
-        </p:spPr>
-      </p:pic>
-    </p:spTree>
-    <p:extLst>
-      <p:ext uri="{BB962C8B-B14F-4D97-AF65-F5344CB8AC3E}">
-        <p14:creationId xmlns:p14="http://schemas.microsoft.com/office/powerpoint/2010/main" val="2028870845"/>
-      </p:ext>
-    </p:extLst>
-  </p:cSld>
-  <p:clrMapOvr>
-    <a:masterClrMapping/>
-  </p:clrMapOvr>
-</p:sld>
-</file>
-
 <file path=ppt/slides/slide2.xml><?xml version="1.0" encoding="utf-8"?>
 <p:sld xmlns:a="http://schemas.openxmlformats.org/drawingml/2006/main" xmlns:r="http://schemas.openxmlformats.org/officeDocument/2006/relationships" xmlns:p="http://schemas.openxmlformats.org/presentationml/2006/main">
   <p:cSld>
@@ -12898,29 +13189,25 @@
           <a:p>
             <a:r>
               <a:rPr lang="en-US" dirty="0"/>
-              <a:t>Basic Concepts - What is a Class ?</a:t>
+              <a:t>Basic Concepts - What is a Class ?  How does it work?</a:t>
             </a:r>
           </a:p>
           <a:p>
             <a:r>
               <a:rPr lang="en-US" dirty="0"/>
-              <a:t>Why use a Class?</a:t>
+              <a:t>How and Why use a Class?</a:t>
             </a:r>
           </a:p>
           <a:p>
             <a:r>
               <a:rPr lang="en-US" dirty="0"/>
-              <a:t>How do you use a Class?</a:t>
+              <a:t>Some Example Code snippets</a:t>
             </a:r>
           </a:p>
           <a:p>
             <a:r>
               <a:rPr lang="en-US" dirty="0"/>
-              <a:t>Some Examples </a:t>
-            </a:r>
-            <a:r>
-              <a:rPr lang="en-US" sz="1200" dirty="0"/>
-              <a:t>(+ Inspecting Class Programming)</a:t>
+              <a:t>Inspecting the LED2 Class in some detail</a:t>
             </a:r>
           </a:p>
         </p:txBody>
@@ -13010,6 +13297,144 @@
           <a:p>
             <a:r>
               <a:rPr lang="en-US" dirty="0"/>
+              <a:t>Why Not use a Class?</a:t>
+            </a:r>
+          </a:p>
+        </p:txBody>
+      </p:sp>
+      <p:sp>
+        <p:nvSpPr>
+          <p:cNvPr id="5" name="Content Placeholder 4"/>
+          <p:cNvSpPr>
+            <a:spLocks noGrp="1"/>
+          </p:cNvSpPr>
+          <p:nvPr>
+            <p:ph idx="1"/>
+          </p:nvPr>
+        </p:nvSpPr>
+        <p:spPr/>
+        <p:txBody>
+          <a:bodyPr>
+            <a:normAutofit fontScale="92500" lnSpcReduction="10000"/>
+          </a:bodyPr>
+          <a:lstStyle/>
+          <a:p>
+            <a:r>
+              <a:rPr lang="en-US" sz="2400" dirty="0"/>
+              <a:t>For some applications they are not needed so why use a class to do what might be a trivial thing</a:t>
+            </a:r>
+          </a:p>
+          <a:p>
+            <a:r>
+              <a:rPr lang="en-US" sz="2400" dirty="0"/>
+              <a:t>Classes are still programs and programs do have bugs.</a:t>
+            </a:r>
+          </a:p>
+          <a:p>
+            <a:r>
+              <a:rPr lang="en-US" sz="2400" dirty="0"/>
+              <a:t>All that hidden complexity might represent a can of worms if you did not write the code but still need to dig into it.</a:t>
+            </a:r>
+          </a:p>
+          <a:p>
+            <a:r>
+              <a:rPr lang="en-US" sz="2400" dirty="0"/>
+              <a:t>There is a learning curve, especially if a class has lots of properties and methods.</a:t>
+            </a:r>
+          </a:p>
+          <a:p>
+            <a:r>
+              <a:rPr lang="en-US" sz="2400" dirty="0"/>
+              <a:t>Changing a class can have knock on effects to many programs that depend on it working a certain way</a:t>
+            </a:r>
+          </a:p>
+        </p:txBody>
+      </p:sp>
+      <p:pic>
+        <p:nvPicPr>
+          <p:cNvPr id="6" name="Picture 5">
+            <a:extLst>
+              <a:ext uri="{FF2B5EF4-FFF2-40B4-BE49-F238E27FC236}">
+                <a16:creationId xmlns:a16="http://schemas.microsoft.com/office/drawing/2014/main" id="{61FF043E-6FDA-432B-A008-FB89E7C32177}"/>
+              </a:ext>
+            </a:extLst>
+          </p:cNvPr>
+          <p:cNvPicPr>
+            <a:picLocks noChangeAspect="1"/>
+          </p:cNvPicPr>
+          <p:nvPr/>
+        </p:nvPicPr>
+        <p:blipFill>
+          <a:blip r:embed="rId3" cstate="print">
+            <a:extLst>
+              <a:ext uri="{28A0092B-C50C-407E-A947-70E740481C1C}">
+                <a14:useLocalDpi xmlns:a14="http://schemas.microsoft.com/office/drawing/2010/main" val="0"/>
+              </a:ext>
+            </a:extLst>
+          </a:blip>
+          <a:stretch>
+            <a:fillRect/>
+          </a:stretch>
+        </p:blipFill>
+        <p:spPr>
+          <a:xfrm>
+            <a:off x="7848600" y="4583336"/>
+            <a:ext cx="1028700" cy="457771"/>
+          </a:xfrm>
+          <a:prstGeom prst="rect">
+            <a:avLst/>
+          </a:prstGeom>
+        </p:spPr>
+      </p:pic>
+    </p:spTree>
+    <p:extLst>
+      <p:ext uri="{BB962C8B-B14F-4D97-AF65-F5344CB8AC3E}">
+        <p14:creationId xmlns:p14="http://schemas.microsoft.com/office/powerpoint/2010/main" val="2028870845"/>
+      </p:ext>
+    </p:extLst>
+  </p:cSld>
+  <p:clrMapOvr>
+    <a:masterClrMapping/>
+  </p:clrMapOvr>
+</p:sld>
+</file>
+
+<file path=ppt/slides/slide21.xml><?xml version="1.0" encoding="utf-8"?>
+<p:sld xmlns:a="http://schemas.openxmlformats.org/drawingml/2006/main" xmlns:r="http://schemas.openxmlformats.org/officeDocument/2006/relationships" xmlns:p="http://schemas.openxmlformats.org/presentationml/2006/main">
+  <p:cSld>
+    <p:spTree>
+      <p:nvGrpSpPr>
+        <p:cNvPr id="1" name=""/>
+        <p:cNvGrpSpPr/>
+        <p:nvPr/>
+      </p:nvGrpSpPr>
+      <p:grpSpPr>
+        <a:xfrm>
+          <a:off x="0" y="0"/>
+          <a:ext cx="0" cy="0"/>
+          <a:chOff x="0" y="0"/>
+          <a:chExt cx="0" cy="0"/>
+        </a:xfrm>
+      </p:grpSpPr>
+      <p:sp>
+        <p:nvSpPr>
+          <p:cNvPr id="4" name="Title 3"/>
+          <p:cNvSpPr>
+            <a:spLocks noGrp="1"/>
+          </p:cNvSpPr>
+          <p:nvPr>
+            <p:ph type="title"/>
+          </p:nvPr>
+        </p:nvSpPr>
+        <p:spPr/>
+        <p:txBody>
+          <a:bodyPr>
+            <a:normAutofit/>
+          </a:bodyPr>
+          <a:lstStyle/>
+          <a:p>
+            <a:r>
+              <a:rPr lang="en-US" dirty="0"/>
               <a:t>Lessons Learned</a:t>
             </a:r>
           </a:p>
@@ -13066,7 +13491,7 @@
               <a:rPr lang="en-US" sz="2400" dirty="0">
                 <a:cs typeface="Courier New" panose="02070309020205020404" pitchFamily="49" charset="0"/>
               </a:rPr>
-              <a:t>These important aspects are often poorly documented. Realizing the true power of the class can become a real challenge under such conditions.</a:t>
+              <a:t>These aspects are often poorly documented. Realizing the true power of a class is a challenge under such conditions and users might be reluctant to accept the implementation at face value.</a:t>
             </a:r>
           </a:p>
           <a:p>
@@ -13086,12 +13511,6 @@
               <a:latin typeface="Courier New" panose="02070309020205020404" pitchFamily="49" charset="0"/>
               <a:cs typeface="Courier New" panose="02070309020205020404" pitchFamily="49" charset="0"/>
             </a:endParaRPr>
-          </a:p>
-          <a:p>
-            <a:pPr marL="0" indent="0">
-              <a:buNone/>
-            </a:pPr>
-            <a:endParaRPr lang="en-US" dirty="0"/>
           </a:p>
         </p:txBody>
       </p:sp>
@@ -13144,7 +13563,1489 @@
 </p:sld>
 </file>
 
-<file path=ppt/slides/slide21.xml><?xml version="1.0" encoding="utf-8"?>
+<file path=ppt/slides/slide22.xml><?xml version="1.0" encoding="utf-8"?>
+<p:sld xmlns:a="http://schemas.openxmlformats.org/drawingml/2006/main" xmlns:r="http://schemas.openxmlformats.org/officeDocument/2006/relationships" xmlns:p="http://schemas.openxmlformats.org/presentationml/2006/main">
+  <p:cSld>
+    <p:spTree>
+      <p:nvGrpSpPr>
+        <p:cNvPr id="1" name=""/>
+        <p:cNvGrpSpPr/>
+        <p:nvPr/>
+      </p:nvGrpSpPr>
+      <p:grpSpPr>
+        <a:xfrm>
+          <a:off x="0" y="0"/>
+          <a:ext cx="0" cy="0"/>
+          <a:chOff x="0" y="0"/>
+          <a:chExt cx="0" cy="0"/>
+        </a:xfrm>
+      </p:grpSpPr>
+      <p:sp>
+        <p:nvSpPr>
+          <p:cNvPr id="4" name="Title 3"/>
+          <p:cNvSpPr>
+            <a:spLocks noGrp="1"/>
+          </p:cNvSpPr>
+          <p:nvPr>
+            <p:ph type="title"/>
+          </p:nvPr>
+        </p:nvSpPr>
+        <p:spPr>
+          <a:xfrm>
+            <a:off x="304800" y="133350"/>
+            <a:ext cx="7016194" cy="485987"/>
+          </a:xfrm>
+        </p:spPr>
+        <p:txBody>
+          <a:bodyPr>
+            <a:normAutofit fontScale="90000"/>
+          </a:bodyPr>
+          <a:lstStyle/>
+          <a:p>
+            <a:r>
+              <a:rPr lang="en-US" dirty="0"/>
+              <a:t>LED2.H</a:t>
+            </a:r>
+          </a:p>
+        </p:txBody>
+      </p:sp>
+      <p:pic>
+        <p:nvPicPr>
+          <p:cNvPr id="6" name="Picture 5">
+            <a:extLst>
+              <a:ext uri="{FF2B5EF4-FFF2-40B4-BE49-F238E27FC236}">
+                <a16:creationId xmlns:a16="http://schemas.microsoft.com/office/drawing/2014/main" id="{33351060-18E6-42F7-BAE2-6A49CB9B0F0C}"/>
+              </a:ext>
+            </a:extLst>
+          </p:cNvPr>
+          <p:cNvPicPr>
+            <a:picLocks noChangeAspect="1"/>
+          </p:cNvPicPr>
+          <p:nvPr/>
+        </p:nvPicPr>
+        <p:blipFill>
+          <a:blip r:embed="rId2" cstate="print">
+            <a:extLst>
+              <a:ext uri="{28A0092B-C50C-407E-A947-70E740481C1C}">
+                <a14:useLocalDpi xmlns:a14="http://schemas.microsoft.com/office/drawing/2010/main" val="0"/>
+              </a:ext>
+            </a:extLst>
+          </a:blip>
+          <a:stretch>
+            <a:fillRect/>
+          </a:stretch>
+        </p:blipFill>
+        <p:spPr>
+          <a:xfrm>
+            <a:off x="7848600" y="4583336"/>
+            <a:ext cx="1028700" cy="457771"/>
+          </a:xfrm>
+          <a:prstGeom prst="rect">
+            <a:avLst/>
+          </a:prstGeom>
+        </p:spPr>
+      </p:pic>
+      <p:sp>
+        <p:nvSpPr>
+          <p:cNvPr id="8" name="TextBox 7">
+            <a:extLst>
+              <a:ext uri="{FF2B5EF4-FFF2-40B4-BE49-F238E27FC236}">
+                <a16:creationId xmlns:a16="http://schemas.microsoft.com/office/drawing/2014/main" id="{A8209684-1BEE-4D92-A36E-99ADF8AACF2C}"/>
+              </a:ext>
+            </a:extLst>
+          </p:cNvPr>
+          <p:cNvSpPr txBox="1"/>
+          <p:nvPr/>
+        </p:nvSpPr>
+        <p:spPr>
+          <a:xfrm>
+            <a:off x="762000" y="742950"/>
+            <a:ext cx="7232226" cy="4185761"/>
+          </a:xfrm>
+          <a:prstGeom prst="rect">
+            <a:avLst/>
+          </a:prstGeom>
+          <a:noFill/>
+        </p:spPr>
+        <p:txBody>
+          <a:bodyPr wrap="square">
+            <a:spAutoFit/>
+          </a:bodyPr>
+          <a:lstStyle/>
+          <a:p>
+            <a:r>
+              <a:rPr lang="en-US" sz="700" dirty="0">
+                <a:latin typeface="Courier New" panose="02070309020205020404" pitchFamily="49" charset="0"/>
+                <a:cs typeface="Courier New" panose="02070309020205020404" pitchFamily="49" charset="0"/>
+              </a:rPr>
+              <a:t>#ifndef MY_LED2_H</a:t>
+            </a:r>
+          </a:p>
+          <a:p>
+            <a:r>
+              <a:rPr lang="en-US" sz="700" dirty="0">
+                <a:latin typeface="Courier New" panose="02070309020205020404" pitchFamily="49" charset="0"/>
+                <a:cs typeface="Courier New" panose="02070309020205020404" pitchFamily="49" charset="0"/>
+              </a:rPr>
+              <a:t>#define MY_LED2_H</a:t>
+            </a:r>
+          </a:p>
+          <a:p>
+            <a:r>
+              <a:rPr lang="en-US" sz="700" dirty="0">
+                <a:latin typeface="Courier New" panose="02070309020205020404" pitchFamily="49" charset="0"/>
+                <a:cs typeface="Courier New" panose="02070309020205020404" pitchFamily="49" charset="0"/>
+              </a:rPr>
+              <a:t>#include "</a:t>
+            </a:r>
+            <a:r>
+              <a:rPr lang="en-US" sz="700" dirty="0" err="1">
+                <a:latin typeface="Courier New" panose="02070309020205020404" pitchFamily="49" charset="0"/>
+                <a:cs typeface="Courier New" panose="02070309020205020404" pitchFamily="49" charset="0"/>
+              </a:rPr>
+              <a:t>Arduino.h</a:t>
+            </a:r>
+            <a:r>
+              <a:rPr lang="en-US" sz="700" dirty="0">
+                <a:latin typeface="Courier New" panose="02070309020205020404" pitchFamily="49" charset="0"/>
+                <a:cs typeface="Courier New" panose="02070309020205020404" pitchFamily="49" charset="0"/>
+              </a:rPr>
+              <a:t>"</a:t>
+            </a:r>
+          </a:p>
+          <a:p>
+            <a:r>
+              <a:rPr lang="en-US" sz="700" dirty="0">
+                <a:latin typeface="Courier New" panose="02070309020205020404" pitchFamily="49" charset="0"/>
+                <a:cs typeface="Courier New" panose="02070309020205020404" pitchFamily="49" charset="0"/>
+              </a:rPr>
+              <a:t>/*</a:t>
+            </a:r>
+          </a:p>
+          <a:p>
+            <a:r>
+              <a:rPr lang="en-US" sz="700" dirty="0">
+                <a:latin typeface="Courier New" panose="02070309020205020404" pitchFamily="49" charset="0"/>
+                <a:cs typeface="Courier New" panose="02070309020205020404" pitchFamily="49" charset="0"/>
+              </a:rPr>
+              <a:t> *****************************************************</a:t>
+            </a:r>
+          </a:p>
+          <a:p>
+            <a:r>
+              <a:rPr lang="en-US" sz="700" dirty="0">
+                <a:latin typeface="Courier New" panose="02070309020205020404" pitchFamily="49" charset="0"/>
+                <a:cs typeface="Courier New" panose="02070309020205020404" pitchFamily="49" charset="0"/>
+              </a:rPr>
+              <a:t> ** LED2_H                                          **</a:t>
+            </a:r>
+          </a:p>
+          <a:p>
+            <a:r>
+              <a:rPr lang="en-US" sz="700" dirty="0">
+                <a:latin typeface="Courier New" panose="02070309020205020404" pitchFamily="49" charset="0"/>
+                <a:cs typeface="Courier New" panose="02070309020205020404" pitchFamily="49" charset="0"/>
+              </a:rPr>
+              <a:t> **                                                 **</a:t>
+            </a:r>
+          </a:p>
+          <a:p>
+            <a:r>
+              <a:rPr lang="en-US" sz="700" dirty="0">
+                <a:latin typeface="Courier New" panose="02070309020205020404" pitchFamily="49" charset="0"/>
+                <a:cs typeface="Courier New" panose="02070309020205020404" pitchFamily="49" charset="0"/>
+              </a:rPr>
+              <a:t> ** This class implements standard LED on-off       **</a:t>
+            </a:r>
+          </a:p>
+          <a:p>
+            <a:r>
+              <a:rPr lang="en-US" sz="700" dirty="0">
+                <a:latin typeface="Courier New" panose="02070309020205020404" pitchFamily="49" charset="0"/>
+                <a:cs typeface="Courier New" panose="02070309020205020404" pitchFamily="49" charset="0"/>
+              </a:rPr>
+              <a:t> ** logic on a pin you specify plus a configurable  **</a:t>
+            </a:r>
+          </a:p>
+          <a:p>
+            <a:r>
+              <a:rPr lang="en-US" sz="700" dirty="0">
+                <a:latin typeface="Courier New" panose="02070309020205020404" pitchFamily="49" charset="0"/>
+                <a:cs typeface="Courier New" panose="02070309020205020404" pitchFamily="49" charset="0"/>
+              </a:rPr>
+              <a:t> ** blinking effect. It does so without any delay   **</a:t>
+            </a:r>
+          </a:p>
+          <a:p>
+            <a:r>
+              <a:rPr lang="en-US" sz="700" dirty="0">
+                <a:latin typeface="Courier New" panose="02070309020205020404" pitchFamily="49" charset="0"/>
+                <a:cs typeface="Courier New" panose="02070309020205020404" pitchFamily="49" charset="0"/>
+              </a:rPr>
+              <a:t> ** calls. (no blocking code)                       **</a:t>
+            </a:r>
+          </a:p>
+          <a:p>
+            <a:r>
+              <a:rPr lang="en-US" sz="700" dirty="0">
+                <a:latin typeface="Courier New" panose="02070309020205020404" pitchFamily="49" charset="0"/>
+                <a:cs typeface="Courier New" panose="02070309020205020404" pitchFamily="49" charset="0"/>
+              </a:rPr>
+              <a:t> *****************************************************</a:t>
+            </a:r>
+          </a:p>
+          <a:p>
+            <a:r>
+              <a:rPr lang="en-US" sz="700" dirty="0">
+                <a:latin typeface="Courier New" panose="02070309020205020404" pitchFamily="49" charset="0"/>
+                <a:cs typeface="Courier New" panose="02070309020205020404" pitchFamily="49" charset="0"/>
+              </a:rPr>
+              <a:t>*/</a:t>
+            </a:r>
+          </a:p>
+          <a:p>
+            <a:r>
+              <a:rPr lang="en-US" sz="700" dirty="0">
+                <a:latin typeface="Courier New" panose="02070309020205020404" pitchFamily="49" charset="0"/>
+                <a:cs typeface="Courier New" panose="02070309020205020404" pitchFamily="49" charset="0"/>
+              </a:rPr>
+              <a:t>class Led2 {</a:t>
+            </a:r>
+          </a:p>
+          <a:p>
+            <a:r>
+              <a:rPr lang="en-US" sz="700" dirty="0">
+                <a:latin typeface="Courier New" panose="02070309020205020404" pitchFamily="49" charset="0"/>
+                <a:cs typeface="Courier New" panose="02070309020205020404" pitchFamily="49" charset="0"/>
+              </a:rPr>
+              <a:t>  private:</a:t>
+            </a:r>
+          </a:p>
+          <a:p>
+            <a:r>
+              <a:rPr lang="en-US" sz="700" dirty="0">
+                <a:latin typeface="Courier New" panose="02070309020205020404" pitchFamily="49" charset="0"/>
+                <a:cs typeface="Courier New" panose="02070309020205020404" pitchFamily="49" charset="0"/>
+              </a:rPr>
+              <a:t>    int _pin;                // the number of the LED pin</a:t>
+            </a:r>
+          </a:p>
+          <a:p>
+            <a:r>
+              <a:rPr lang="en-US" sz="700" dirty="0">
+                <a:latin typeface="Courier New" panose="02070309020205020404" pitchFamily="49" charset="0"/>
+                <a:cs typeface="Courier New" panose="02070309020205020404" pitchFamily="49" charset="0"/>
+              </a:rPr>
+              <a:t>    long _onTime;            // milliseconds of on-time</a:t>
+            </a:r>
+          </a:p>
+          <a:p>
+            <a:r>
+              <a:rPr lang="en-US" sz="700" dirty="0">
+                <a:latin typeface="Courier New" panose="02070309020205020404" pitchFamily="49" charset="0"/>
+                <a:cs typeface="Courier New" panose="02070309020205020404" pitchFamily="49" charset="0"/>
+              </a:rPr>
+              <a:t>    long _offTime;           // milliseconds of off-time</a:t>
+            </a:r>
+          </a:p>
+          <a:p>
+            <a:r>
+              <a:rPr lang="en-US" sz="700" dirty="0">
+                <a:latin typeface="Courier New" panose="02070309020205020404" pitchFamily="49" charset="0"/>
+                <a:cs typeface="Courier New" panose="02070309020205020404" pitchFamily="49" charset="0"/>
+              </a:rPr>
+              <a:t>    bool _blink;             // true if we are in blinking mode, false if not</a:t>
+            </a:r>
+          </a:p>
+          <a:p>
+            <a:r>
+              <a:rPr lang="en-US" sz="700" dirty="0">
+                <a:latin typeface="Courier New" panose="02070309020205020404" pitchFamily="49" charset="0"/>
+                <a:cs typeface="Courier New" panose="02070309020205020404" pitchFamily="49" charset="0"/>
+              </a:rPr>
+              <a:t>    int _state;              // </a:t>
+            </a:r>
+            <a:r>
+              <a:rPr lang="en-US" sz="700" dirty="0" err="1">
+                <a:latin typeface="Courier New" panose="02070309020205020404" pitchFamily="49" charset="0"/>
+                <a:cs typeface="Courier New" panose="02070309020205020404" pitchFamily="49" charset="0"/>
+              </a:rPr>
+              <a:t>ledstate</a:t>
+            </a:r>
+            <a:r>
+              <a:rPr lang="en-US" sz="700" dirty="0">
+                <a:latin typeface="Courier New" panose="02070309020205020404" pitchFamily="49" charset="0"/>
+                <a:cs typeface="Courier New" panose="02070309020205020404" pitchFamily="49" charset="0"/>
+              </a:rPr>
+              <a:t> used to set the LED</a:t>
+            </a:r>
+          </a:p>
+          <a:p>
+            <a:r>
+              <a:rPr lang="en-US" sz="700" dirty="0">
+                <a:latin typeface="Courier New" panose="02070309020205020404" pitchFamily="49" charset="0"/>
+                <a:cs typeface="Courier New" panose="02070309020205020404" pitchFamily="49" charset="0"/>
+              </a:rPr>
+              <a:t>    unsigned long _previousMillis;      // the last time LED was updated</a:t>
+            </a:r>
+          </a:p>
+          <a:p>
+            <a:r>
+              <a:rPr lang="en-US" sz="700" dirty="0">
+                <a:latin typeface="Courier New" panose="02070309020205020404" pitchFamily="49" charset="0"/>
+                <a:cs typeface="Courier New" panose="02070309020205020404" pitchFamily="49" charset="0"/>
+              </a:rPr>
+              <a:t>    void init();             // Initialization code</a:t>
+            </a:r>
+          </a:p>
+          <a:p>
+            <a:endParaRPr lang="en-US" sz="700" dirty="0">
+              <a:latin typeface="Courier New" panose="02070309020205020404" pitchFamily="49" charset="0"/>
+              <a:cs typeface="Courier New" panose="02070309020205020404" pitchFamily="49" charset="0"/>
+            </a:endParaRPr>
+          </a:p>
+          <a:p>
+            <a:r>
+              <a:rPr lang="en-US" sz="700" dirty="0">
+                <a:latin typeface="Courier New" panose="02070309020205020404" pitchFamily="49" charset="0"/>
+                <a:cs typeface="Courier New" panose="02070309020205020404" pitchFamily="49" charset="0"/>
+              </a:rPr>
+              <a:t>  public:</a:t>
+            </a:r>
+          </a:p>
+          <a:p>
+            <a:r>
+              <a:rPr lang="en-US" sz="700" dirty="0">
+                <a:latin typeface="Courier New" panose="02070309020205020404" pitchFamily="49" charset="0"/>
+                <a:cs typeface="Courier New" panose="02070309020205020404" pitchFamily="49" charset="0"/>
+              </a:rPr>
+              <a:t>    Led2(byte pin);                     // Simple default definition without a pre specified on and off time.</a:t>
+            </a:r>
+          </a:p>
+          <a:p>
+            <a:r>
+              <a:rPr lang="en-US" sz="700" dirty="0">
+                <a:latin typeface="Courier New" panose="02070309020205020404" pitchFamily="49" charset="0"/>
+                <a:cs typeface="Courier New" panose="02070309020205020404" pitchFamily="49" charset="0"/>
+              </a:rPr>
+              <a:t>    Led2(byte pin, long on, long off);  // this definition includes the on and off time values from the outset</a:t>
+            </a:r>
+          </a:p>
+          <a:p>
+            <a:r>
+              <a:rPr lang="en-US" sz="700" dirty="0">
+                <a:latin typeface="Courier New" panose="02070309020205020404" pitchFamily="49" charset="0"/>
+                <a:cs typeface="Courier New" panose="02070309020205020404" pitchFamily="49" charset="0"/>
+              </a:rPr>
+              <a:t>    void update();                      // update things based on elapsed time (call this as often as possible)</a:t>
+            </a:r>
+          </a:p>
+          <a:p>
+            <a:r>
+              <a:rPr lang="en-US" sz="700" dirty="0">
+                <a:latin typeface="Courier New" panose="02070309020205020404" pitchFamily="49" charset="0"/>
+                <a:cs typeface="Courier New" panose="02070309020205020404" pitchFamily="49" charset="0"/>
+              </a:rPr>
+              <a:t>    bool getState();                    // Return the current state of LED</a:t>
+            </a:r>
+          </a:p>
+          <a:p>
+            <a:r>
+              <a:rPr lang="en-US" sz="700" dirty="0">
+                <a:latin typeface="Courier New" panose="02070309020205020404" pitchFamily="49" charset="0"/>
+                <a:cs typeface="Courier New" panose="02070309020205020404" pitchFamily="49" charset="0"/>
+              </a:rPr>
+              <a:t>    bool getBlink();                    // return the LEDs current blinking state (true / false)</a:t>
+            </a:r>
+          </a:p>
+          <a:p>
+            <a:r>
+              <a:rPr lang="en-US" sz="700" dirty="0">
+                <a:latin typeface="Courier New" panose="02070309020205020404" pitchFamily="49" charset="0"/>
+                <a:cs typeface="Courier New" panose="02070309020205020404" pitchFamily="49" charset="0"/>
+              </a:rPr>
+              <a:t>    void onTime(long on);               // Set the onTime to a new value</a:t>
+            </a:r>
+          </a:p>
+          <a:p>
+            <a:r>
+              <a:rPr lang="en-US" sz="700" dirty="0">
+                <a:latin typeface="Courier New" panose="02070309020205020404" pitchFamily="49" charset="0"/>
+                <a:cs typeface="Courier New" panose="02070309020205020404" pitchFamily="49" charset="0"/>
+              </a:rPr>
+              <a:t>    long onTime();                      // Return the current onTime</a:t>
+            </a:r>
+          </a:p>
+          <a:p>
+            <a:r>
+              <a:rPr lang="en-US" sz="700" dirty="0">
+                <a:latin typeface="Courier New" panose="02070309020205020404" pitchFamily="49" charset="0"/>
+                <a:cs typeface="Courier New" panose="02070309020205020404" pitchFamily="49" charset="0"/>
+              </a:rPr>
+              <a:t>    void offTime(long off);             // Set the offTime to a new value</a:t>
+            </a:r>
+          </a:p>
+          <a:p>
+            <a:r>
+              <a:rPr lang="en-US" sz="700" dirty="0">
+                <a:latin typeface="Courier New" panose="02070309020205020404" pitchFamily="49" charset="0"/>
+                <a:cs typeface="Courier New" panose="02070309020205020404" pitchFamily="49" charset="0"/>
+              </a:rPr>
+              <a:t>    long offTime();                     // Return the current offTime</a:t>
+            </a:r>
+          </a:p>
+          <a:p>
+            <a:r>
+              <a:rPr lang="en-US" sz="700" dirty="0">
+                <a:latin typeface="Courier New" panose="02070309020205020404" pitchFamily="49" charset="0"/>
+                <a:cs typeface="Courier New" panose="02070309020205020404" pitchFamily="49" charset="0"/>
+              </a:rPr>
+              <a:t>    void off();                         // Set the On time to zero and the Off time to 500 - Turning off the LED</a:t>
+            </a:r>
+          </a:p>
+          <a:p>
+            <a:r>
+              <a:rPr lang="en-US" sz="700" dirty="0">
+                <a:latin typeface="Courier New" panose="02070309020205020404" pitchFamily="49" charset="0"/>
+                <a:cs typeface="Courier New" panose="02070309020205020404" pitchFamily="49" charset="0"/>
+              </a:rPr>
+              <a:t>    void on();                          // Set the Off time to zero and the On time to 500 - Turning on the LED</a:t>
+            </a:r>
+          </a:p>
+          <a:p>
+            <a:r>
+              <a:rPr lang="en-US" sz="700" dirty="0">
+                <a:latin typeface="Courier New" panose="02070309020205020404" pitchFamily="49" charset="0"/>
+                <a:cs typeface="Courier New" panose="02070309020205020404" pitchFamily="49" charset="0"/>
+              </a:rPr>
+              <a:t>    void blink();                       // set the LED to a blinking state using the previously set timing values</a:t>
+            </a:r>
+          </a:p>
+          <a:p>
+            <a:r>
+              <a:rPr lang="en-US" sz="700" dirty="0">
+                <a:latin typeface="Courier New" panose="02070309020205020404" pitchFamily="49" charset="0"/>
+                <a:cs typeface="Courier New" panose="02070309020205020404" pitchFamily="49" charset="0"/>
+              </a:rPr>
+              <a:t>};</a:t>
+            </a:r>
+          </a:p>
+          <a:p>
+            <a:r>
+              <a:rPr lang="en-US" sz="700" dirty="0">
+                <a:latin typeface="Courier New" panose="02070309020205020404" pitchFamily="49" charset="0"/>
+                <a:cs typeface="Courier New" panose="02070309020205020404" pitchFamily="49" charset="0"/>
+              </a:rPr>
+              <a:t>#endif</a:t>
+            </a:r>
+          </a:p>
+        </p:txBody>
+      </p:sp>
+    </p:spTree>
+    <p:extLst>
+      <p:ext uri="{BB962C8B-B14F-4D97-AF65-F5344CB8AC3E}">
+        <p14:creationId xmlns:p14="http://schemas.microsoft.com/office/powerpoint/2010/main" val="575056528"/>
+      </p:ext>
+    </p:extLst>
+  </p:cSld>
+  <p:clrMapOvr>
+    <a:masterClrMapping/>
+  </p:clrMapOvr>
+</p:sld>
+</file>
+
+<file path=ppt/slides/slide23.xml><?xml version="1.0" encoding="utf-8"?>
+<p:sld xmlns:a="http://schemas.openxmlformats.org/drawingml/2006/main" xmlns:r="http://schemas.openxmlformats.org/officeDocument/2006/relationships" xmlns:p="http://schemas.openxmlformats.org/presentationml/2006/main">
+  <p:cSld>
+    <p:spTree>
+      <p:nvGrpSpPr>
+        <p:cNvPr id="1" name=""/>
+        <p:cNvGrpSpPr/>
+        <p:nvPr/>
+      </p:nvGrpSpPr>
+      <p:grpSpPr>
+        <a:xfrm>
+          <a:off x="0" y="0"/>
+          <a:ext cx="0" cy="0"/>
+          <a:chOff x="0" y="0"/>
+          <a:chExt cx="0" cy="0"/>
+        </a:xfrm>
+      </p:grpSpPr>
+      <p:sp>
+        <p:nvSpPr>
+          <p:cNvPr id="4" name="Title 3"/>
+          <p:cNvSpPr>
+            <a:spLocks noGrp="1"/>
+          </p:cNvSpPr>
+          <p:nvPr>
+            <p:ph type="title"/>
+          </p:nvPr>
+        </p:nvSpPr>
+        <p:spPr>
+          <a:xfrm>
+            <a:off x="304800" y="133350"/>
+            <a:ext cx="7016194" cy="485987"/>
+          </a:xfrm>
+        </p:spPr>
+        <p:txBody>
+          <a:bodyPr>
+            <a:normAutofit fontScale="90000"/>
+          </a:bodyPr>
+          <a:lstStyle/>
+          <a:p>
+            <a:r>
+              <a:rPr lang="en-US" dirty="0"/>
+              <a:t>LED2.CPP  (1/3)</a:t>
+            </a:r>
+          </a:p>
+        </p:txBody>
+      </p:sp>
+      <p:pic>
+        <p:nvPicPr>
+          <p:cNvPr id="6" name="Picture 5">
+            <a:extLst>
+              <a:ext uri="{FF2B5EF4-FFF2-40B4-BE49-F238E27FC236}">
+                <a16:creationId xmlns:a16="http://schemas.microsoft.com/office/drawing/2014/main" id="{33351060-18E6-42F7-BAE2-6A49CB9B0F0C}"/>
+              </a:ext>
+            </a:extLst>
+          </p:cNvPr>
+          <p:cNvPicPr>
+            <a:picLocks noChangeAspect="1"/>
+          </p:cNvPicPr>
+          <p:nvPr/>
+        </p:nvPicPr>
+        <p:blipFill>
+          <a:blip r:embed="rId2" cstate="print">
+            <a:extLst>
+              <a:ext uri="{28A0092B-C50C-407E-A947-70E740481C1C}">
+                <a14:useLocalDpi xmlns:a14="http://schemas.microsoft.com/office/drawing/2010/main" val="0"/>
+              </a:ext>
+            </a:extLst>
+          </a:blip>
+          <a:stretch>
+            <a:fillRect/>
+          </a:stretch>
+        </p:blipFill>
+        <p:spPr>
+          <a:xfrm>
+            <a:off x="7848600" y="4583336"/>
+            <a:ext cx="1028700" cy="457771"/>
+          </a:xfrm>
+          <a:prstGeom prst="rect">
+            <a:avLst/>
+          </a:prstGeom>
+        </p:spPr>
+      </p:pic>
+      <p:sp>
+        <p:nvSpPr>
+          <p:cNvPr id="8" name="TextBox 7">
+            <a:extLst>
+              <a:ext uri="{FF2B5EF4-FFF2-40B4-BE49-F238E27FC236}">
+                <a16:creationId xmlns:a16="http://schemas.microsoft.com/office/drawing/2014/main" id="{A8209684-1BEE-4D92-A36E-99ADF8AACF2C}"/>
+              </a:ext>
+            </a:extLst>
+          </p:cNvPr>
+          <p:cNvSpPr txBox="1"/>
+          <p:nvPr/>
+        </p:nvSpPr>
+        <p:spPr>
+          <a:xfrm>
+            <a:off x="762000" y="742950"/>
+            <a:ext cx="7232226" cy="2785378"/>
+          </a:xfrm>
+          <a:prstGeom prst="rect">
+            <a:avLst/>
+          </a:prstGeom>
+          <a:noFill/>
+        </p:spPr>
+        <p:txBody>
+          <a:bodyPr wrap="square">
+            <a:spAutoFit/>
+          </a:bodyPr>
+          <a:lstStyle/>
+          <a:p>
+            <a:r>
+              <a:rPr lang="en-US" sz="700" dirty="0">
+                <a:latin typeface="Courier New" panose="02070309020205020404" pitchFamily="49" charset="0"/>
+                <a:cs typeface="Courier New" panose="02070309020205020404" pitchFamily="49" charset="0"/>
+              </a:rPr>
+              <a:t>#include "Led2.h"</a:t>
+            </a:r>
+          </a:p>
+          <a:p>
+            <a:endParaRPr lang="en-US" sz="700" dirty="0">
+              <a:latin typeface="Courier New" panose="02070309020205020404" pitchFamily="49" charset="0"/>
+              <a:cs typeface="Courier New" panose="02070309020205020404" pitchFamily="49" charset="0"/>
+            </a:endParaRPr>
+          </a:p>
+          <a:p>
+            <a:r>
+              <a:rPr lang="en-US" sz="700" dirty="0">
+                <a:latin typeface="Courier New" panose="02070309020205020404" pitchFamily="49" charset="0"/>
+                <a:cs typeface="Courier New" panose="02070309020205020404" pitchFamily="49" charset="0"/>
+              </a:rPr>
+              <a:t>Led2::Led2(byte pin, long on, long off) {</a:t>
+            </a:r>
+          </a:p>
+          <a:p>
+            <a:r>
+              <a:rPr lang="en-US" sz="700" dirty="0">
+                <a:latin typeface="Courier New" panose="02070309020205020404" pitchFamily="49" charset="0"/>
+                <a:cs typeface="Courier New" panose="02070309020205020404" pitchFamily="49" charset="0"/>
+              </a:rPr>
+              <a:t>  // Save the passed pin and timing values into the equivalent local variables (with underscore)</a:t>
+            </a:r>
+          </a:p>
+          <a:p>
+            <a:r>
+              <a:rPr lang="en-US" sz="700" dirty="0">
+                <a:latin typeface="Courier New" panose="02070309020205020404" pitchFamily="49" charset="0"/>
+                <a:cs typeface="Courier New" panose="02070309020205020404" pitchFamily="49" charset="0"/>
+              </a:rPr>
+              <a:t>  _pin = pin;</a:t>
+            </a:r>
+          </a:p>
+          <a:p>
+            <a:r>
+              <a:rPr lang="en-US" sz="700" dirty="0">
+                <a:latin typeface="Courier New" panose="02070309020205020404" pitchFamily="49" charset="0"/>
+                <a:cs typeface="Courier New" panose="02070309020205020404" pitchFamily="49" charset="0"/>
+              </a:rPr>
+              <a:t>  _onTime = on;</a:t>
+            </a:r>
+          </a:p>
+          <a:p>
+            <a:r>
+              <a:rPr lang="en-US" sz="700" dirty="0">
+                <a:latin typeface="Courier New" panose="02070309020205020404" pitchFamily="49" charset="0"/>
+                <a:cs typeface="Courier New" panose="02070309020205020404" pitchFamily="49" charset="0"/>
+              </a:rPr>
+              <a:t>  _offTime = off;</a:t>
+            </a:r>
+          </a:p>
+          <a:p>
+            <a:r>
+              <a:rPr lang="en-US" sz="700" dirty="0">
+                <a:latin typeface="Courier New" panose="02070309020205020404" pitchFamily="49" charset="0"/>
+                <a:cs typeface="Courier New" panose="02070309020205020404" pitchFamily="49" charset="0"/>
+              </a:rPr>
+              <a:t>  // Initialization code is kept separate just for clarity.</a:t>
+            </a:r>
+          </a:p>
+          <a:p>
+            <a:r>
+              <a:rPr lang="en-US" sz="700" dirty="0">
+                <a:latin typeface="Courier New" panose="02070309020205020404" pitchFamily="49" charset="0"/>
+                <a:cs typeface="Courier New" panose="02070309020205020404" pitchFamily="49" charset="0"/>
+              </a:rPr>
+              <a:t>  init();</a:t>
+            </a:r>
+          </a:p>
+          <a:p>
+            <a:r>
+              <a:rPr lang="en-US" sz="700" dirty="0">
+                <a:latin typeface="Courier New" panose="02070309020205020404" pitchFamily="49" charset="0"/>
+                <a:cs typeface="Courier New" panose="02070309020205020404" pitchFamily="49" charset="0"/>
+              </a:rPr>
+              <a:t>}</a:t>
+            </a:r>
+          </a:p>
+          <a:p>
+            <a:endParaRPr lang="en-US" sz="700" dirty="0">
+              <a:latin typeface="Courier New" panose="02070309020205020404" pitchFamily="49" charset="0"/>
+              <a:cs typeface="Courier New" panose="02070309020205020404" pitchFamily="49" charset="0"/>
+            </a:endParaRPr>
+          </a:p>
+          <a:p>
+            <a:r>
+              <a:rPr lang="en-US" sz="700" dirty="0">
+                <a:latin typeface="Courier New" panose="02070309020205020404" pitchFamily="49" charset="0"/>
+                <a:cs typeface="Courier New" panose="02070309020205020404" pitchFamily="49" charset="0"/>
+              </a:rPr>
+              <a:t>Led2::Led2(byte pin) {</a:t>
+            </a:r>
+          </a:p>
+          <a:p>
+            <a:r>
+              <a:rPr lang="en-US" sz="700" dirty="0">
+                <a:latin typeface="Courier New" panose="02070309020205020404" pitchFamily="49" charset="0"/>
+                <a:cs typeface="Courier New" panose="02070309020205020404" pitchFamily="49" charset="0"/>
+              </a:rPr>
+              <a:t>  // Save the passed pin</a:t>
+            </a:r>
+          </a:p>
+          <a:p>
+            <a:r>
+              <a:rPr lang="en-US" sz="700" dirty="0">
+                <a:latin typeface="Courier New" panose="02070309020205020404" pitchFamily="49" charset="0"/>
+                <a:cs typeface="Courier New" panose="02070309020205020404" pitchFamily="49" charset="0"/>
+              </a:rPr>
+              <a:t>  _pin = pin;</a:t>
+            </a:r>
+          </a:p>
+          <a:p>
+            <a:r>
+              <a:rPr lang="en-US" sz="700" dirty="0">
+                <a:latin typeface="Courier New" panose="02070309020205020404" pitchFamily="49" charset="0"/>
+                <a:cs typeface="Courier New" panose="02070309020205020404" pitchFamily="49" charset="0"/>
+              </a:rPr>
+              <a:t>  init();</a:t>
+            </a:r>
+          </a:p>
+          <a:p>
+            <a:r>
+              <a:rPr lang="en-US" sz="700" dirty="0">
+                <a:latin typeface="Courier New" panose="02070309020205020404" pitchFamily="49" charset="0"/>
+                <a:cs typeface="Courier New" panose="02070309020205020404" pitchFamily="49" charset="0"/>
+              </a:rPr>
+              <a:t>}</a:t>
+            </a:r>
+          </a:p>
+          <a:p>
+            <a:endParaRPr lang="en-US" sz="700" dirty="0">
+              <a:latin typeface="Courier New" panose="02070309020205020404" pitchFamily="49" charset="0"/>
+              <a:cs typeface="Courier New" panose="02070309020205020404" pitchFamily="49" charset="0"/>
+            </a:endParaRPr>
+          </a:p>
+          <a:p>
+            <a:r>
+              <a:rPr lang="en-US" sz="700" dirty="0">
+                <a:latin typeface="Courier New" panose="02070309020205020404" pitchFamily="49" charset="0"/>
+                <a:cs typeface="Courier New" panose="02070309020205020404" pitchFamily="49" charset="0"/>
+              </a:rPr>
+              <a:t>void Led2::init() {</a:t>
+            </a:r>
+          </a:p>
+          <a:p>
+            <a:r>
+              <a:rPr lang="en-US" sz="700" dirty="0">
+                <a:latin typeface="Courier New" panose="02070309020205020404" pitchFamily="49" charset="0"/>
+                <a:cs typeface="Courier New" panose="02070309020205020404" pitchFamily="49" charset="0"/>
+              </a:rPr>
+              <a:t>  pinMode(_pin, OUTPUT);</a:t>
+            </a:r>
+          </a:p>
+          <a:p>
+            <a:r>
+              <a:rPr lang="en-US" sz="700" dirty="0">
+                <a:latin typeface="Courier New" panose="02070309020205020404" pitchFamily="49" charset="0"/>
+                <a:cs typeface="Courier New" panose="02070309020205020404" pitchFamily="49" charset="0"/>
+              </a:rPr>
+              <a:t>  // Initialize local variables for the new class member</a:t>
+            </a:r>
+          </a:p>
+          <a:p>
+            <a:r>
+              <a:rPr lang="en-US" sz="700" dirty="0">
+                <a:latin typeface="Courier New" panose="02070309020205020404" pitchFamily="49" charset="0"/>
+                <a:cs typeface="Courier New" panose="02070309020205020404" pitchFamily="49" charset="0"/>
+              </a:rPr>
+              <a:t>  _state = LOW;                     // start with LED on the off condition</a:t>
+            </a:r>
+          </a:p>
+          <a:p>
+            <a:r>
+              <a:rPr lang="en-US" sz="700" dirty="0">
+                <a:latin typeface="Courier New" panose="02070309020205020404" pitchFamily="49" charset="0"/>
+                <a:cs typeface="Courier New" panose="02070309020205020404" pitchFamily="49" charset="0"/>
+              </a:rPr>
+              <a:t>  _blink = false;                   // no blinking at initialization</a:t>
+            </a:r>
+          </a:p>
+          <a:p>
+            <a:r>
+              <a:rPr lang="en-US" sz="700" dirty="0">
+                <a:latin typeface="Courier New" panose="02070309020205020404" pitchFamily="49" charset="0"/>
+                <a:cs typeface="Courier New" panose="02070309020205020404" pitchFamily="49" charset="0"/>
+              </a:rPr>
+              <a:t>  off();                            // call the function that sets out LED to off initially</a:t>
+            </a:r>
+          </a:p>
+          <a:p>
+            <a:r>
+              <a:rPr lang="en-US" sz="700" dirty="0">
+                <a:latin typeface="Courier New" panose="02070309020205020404" pitchFamily="49" charset="0"/>
+                <a:cs typeface="Courier New" panose="02070309020205020404" pitchFamily="49" charset="0"/>
+              </a:rPr>
+              <a:t>}</a:t>
+            </a:r>
+          </a:p>
+          <a:p>
+            <a:endParaRPr lang="en-US" sz="700" dirty="0">
+              <a:latin typeface="Courier New" panose="02070309020205020404" pitchFamily="49" charset="0"/>
+              <a:cs typeface="Courier New" panose="02070309020205020404" pitchFamily="49" charset="0"/>
+            </a:endParaRPr>
+          </a:p>
+        </p:txBody>
+      </p:sp>
+    </p:spTree>
+    <p:extLst>
+      <p:ext uri="{BB962C8B-B14F-4D97-AF65-F5344CB8AC3E}">
+        <p14:creationId xmlns:p14="http://schemas.microsoft.com/office/powerpoint/2010/main" val="3731951025"/>
+      </p:ext>
+    </p:extLst>
+  </p:cSld>
+  <p:clrMapOvr>
+    <a:masterClrMapping/>
+  </p:clrMapOvr>
+</p:sld>
+</file>
+
+<file path=ppt/slides/slide24.xml><?xml version="1.0" encoding="utf-8"?>
+<p:sld xmlns:a="http://schemas.openxmlformats.org/drawingml/2006/main" xmlns:r="http://schemas.openxmlformats.org/officeDocument/2006/relationships" xmlns:p="http://schemas.openxmlformats.org/presentationml/2006/main">
+  <p:cSld>
+    <p:spTree>
+      <p:nvGrpSpPr>
+        <p:cNvPr id="1" name=""/>
+        <p:cNvGrpSpPr/>
+        <p:nvPr/>
+      </p:nvGrpSpPr>
+      <p:grpSpPr>
+        <a:xfrm>
+          <a:off x="0" y="0"/>
+          <a:ext cx="0" cy="0"/>
+          <a:chOff x="0" y="0"/>
+          <a:chExt cx="0" cy="0"/>
+        </a:xfrm>
+      </p:grpSpPr>
+      <p:sp>
+        <p:nvSpPr>
+          <p:cNvPr id="4" name="Title 3"/>
+          <p:cNvSpPr>
+            <a:spLocks noGrp="1"/>
+          </p:cNvSpPr>
+          <p:nvPr>
+            <p:ph type="title"/>
+          </p:nvPr>
+        </p:nvSpPr>
+        <p:spPr>
+          <a:xfrm>
+            <a:off x="304800" y="133350"/>
+            <a:ext cx="7016194" cy="485987"/>
+          </a:xfrm>
+        </p:spPr>
+        <p:txBody>
+          <a:bodyPr>
+            <a:normAutofit fontScale="90000"/>
+          </a:bodyPr>
+          <a:lstStyle/>
+          <a:p>
+            <a:r>
+              <a:rPr lang="en-US" dirty="0"/>
+              <a:t>LED2.CPP  (2/3)</a:t>
+            </a:r>
+          </a:p>
+        </p:txBody>
+      </p:sp>
+      <p:pic>
+        <p:nvPicPr>
+          <p:cNvPr id="6" name="Picture 5">
+            <a:extLst>
+              <a:ext uri="{FF2B5EF4-FFF2-40B4-BE49-F238E27FC236}">
+                <a16:creationId xmlns:a16="http://schemas.microsoft.com/office/drawing/2014/main" id="{33351060-18E6-42F7-BAE2-6A49CB9B0F0C}"/>
+              </a:ext>
+            </a:extLst>
+          </p:cNvPr>
+          <p:cNvPicPr>
+            <a:picLocks noChangeAspect="1"/>
+          </p:cNvPicPr>
+          <p:nvPr/>
+        </p:nvPicPr>
+        <p:blipFill>
+          <a:blip r:embed="rId2" cstate="print">
+            <a:extLst>
+              <a:ext uri="{28A0092B-C50C-407E-A947-70E740481C1C}">
+                <a14:useLocalDpi xmlns:a14="http://schemas.microsoft.com/office/drawing/2010/main" val="0"/>
+              </a:ext>
+            </a:extLst>
+          </a:blip>
+          <a:stretch>
+            <a:fillRect/>
+          </a:stretch>
+        </p:blipFill>
+        <p:spPr>
+          <a:xfrm>
+            <a:off x="7848600" y="4583336"/>
+            <a:ext cx="1028700" cy="457771"/>
+          </a:xfrm>
+          <a:prstGeom prst="rect">
+            <a:avLst/>
+          </a:prstGeom>
+        </p:spPr>
+      </p:pic>
+      <p:sp>
+        <p:nvSpPr>
+          <p:cNvPr id="8" name="TextBox 7">
+            <a:extLst>
+              <a:ext uri="{FF2B5EF4-FFF2-40B4-BE49-F238E27FC236}">
+                <a16:creationId xmlns:a16="http://schemas.microsoft.com/office/drawing/2014/main" id="{A8209684-1BEE-4D92-A36E-99ADF8AACF2C}"/>
+              </a:ext>
+            </a:extLst>
+          </p:cNvPr>
+          <p:cNvSpPr txBox="1"/>
+          <p:nvPr/>
+        </p:nvSpPr>
+        <p:spPr>
+          <a:xfrm>
+            <a:off x="762000" y="742950"/>
+            <a:ext cx="7232226" cy="4185761"/>
+          </a:xfrm>
+          <a:prstGeom prst="rect">
+            <a:avLst/>
+          </a:prstGeom>
+          <a:noFill/>
+        </p:spPr>
+        <p:txBody>
+          <a:bodyPr wrap="square">
+            <a:spAutoFit/>
+          </a:bodyPr>
+          <a:lstStyle>
+            <a:defPPr>
+              <a:defRPr lang="en-US"/>
+            </a:defPPr>
+            <a:lvl1pPr>
+              <a:defRPr sz="700">
+                <a:latin typeface="Courier New" panose="02070309020205020404" pitchFamily="49" charset="0"/>
+                <a:cs typeface="Courier New" panose="02070309020205020404" pitchFamily="49" charset="0"/>
+              </a:defRPr>
+            </a:lvl1pPr>
+          </a:lstStyle>
+          <a:p>
+            <a:r>
+              <a:rPr lang="en-US" dirty="0"/>
+              <a:t>void Led2::update() {</a:t>
+            </a:r>
+          </a:p>
+          <a:p>
+            <a:r>
+              <a:rPr lang="en-US" dirty="0"/>
+              <a:t>  // check to see if it's time to change the state of the LED</a:t>
+            </a:r>
+          </a:p>
+          <a:p>
+            <a:r>
+              <a:rPr lang="en-US" dirty="0"/>
+              <a:t>  unsigned long currentMillis = millis();</a:t>
+            </a:r>
+          </a:p>
+          <a:p>
+            <a:r>
+              <a:rPr lang="en-US" dirty="0"/>
+              <a:t>  if (!_blink) {                   // If not in blinking mode just look at on or off conditions</a:t>
+            </a:r>
+          </a:p>
+          <a:p>
+            <a:r>
+              <a:rPr lang="en-US" dirty="0"/>
+              <a:t>    if (_state == LOW) {</a:t>
+            </a:r>
+          </a:p>
+          <a:p>
+            <a:r>
+              <a:rPr lang="en-US" dirty="0"/>
+              <a:t>      digitalWrite(_pin, LOW);     // Turn off the actual LED.</a:t>
+            </a:r>
+          </a:p>
+          <a:p>
+            <a:r>
+              <a:rPr lang="en-US" dirty="0"/>
+              <a:t>    }</a:t>
+            </a:r>
+          </a:p>
+          <a:p>
+            <a:r>
+              <a:rPr lang="en-US" dirty="0"/>
+              <a:t>    else if (_state == HIGH) {</a:t>
+            </a:r>
+          </a:p>
+          <a:p>
+            <a:r>
+              <a:rPr lang="en-US" dirty="0"/>
+              <a:t>      digitalWrite(_pin, HIGH);    // Turn on the actual LED.</a:t>
+            </a:r>
+          </a:p>
+          <a:p>
+            <a:r>
+              <a:rPr lang="en-US" dirty="0"/>
+              <a:t>    }</a:t>
+            </a:r>
+          </a:p>
+          <a:p>
+            <a:r>
+              <a:rPr lang="en-US" dirty="0"/>
+              <a:t>  }</a:t>
+            </a:r>
+          </a:p>
+          <a:p>
+            <a:r>
+              <a:rPr lang="en-US" dirty="0"/>
+              <a:t>  else {                           // We are in blinking mode so cycle accordingly</a:t>
+            </a:r>
+          </a:p>
+          <a:p>
+            <a:r>
+              <a:rPr lang="en-US" dirty="0"/>
+              <a:t>    if ((_state == HIGH) &amp;&amp; (currentMillis - _previousMillis &gt;= _onTime)) {</a:t>
+            </a:r>
+          </a:p>
+          <a:p>
+            <a:r>
+              <a:rPr lang="en-US" dirty="0"/>
+              <a:t>      _state = LOW;  // Turn it off</a:t>
+            </a:r>
+          </a:p>
+          <a:p>
+            <a:r>
+              <a:rPr lang="en-US" dirty="0"/>
+              <a:t>      _previousMillis = currentMillis;     // Remember the time</a:t>
+            </a:r>
+          </a:p>
+          <a:p>
+            <a:r>
+              <a:rPr lang="en-US" dirty="0"/>
+              <a:t>    }</a:t>
+            </a:r>
+          </a:p>
+          <a:p>
+            <a:r>
+              <a:rPr lang="en-US" dirty="0"/>
+              <a:t>    else if ((_state == LOW) &amp;&amp; (currentMillis - _previousMillis &gt;= _offTime)) {</a:t>
+            </a:r>
+          </a:p>
+          <a:p>
+            <a:r>
+              <a:rPr lang="en-US" dirty="0"/>
+              <a:t>      _state = HIGH;  // turn it on</a:t>
+            </a:r>
+          </a:p>
+          <a:p>
+            <a:r>
+              <a:rPr lang="en-US" dirty="0"/>
+              <a:t>      _previousMillis = currentMillis;    // Remember the time</a:t>
+            </a:r>
+          </a:p>
+          <a:p>
+            <a:r>
+              <a:rPr lang="en-US" dirty="0"/>
+              <a:t>    }</a:t>
+            </a:r>
+          </a:p>
+          <a:p>
+            <a:r>
+              <a:rPr lang="en-US" dirty="0"/>
+              <a:t>    digitalWrite(_pin, _state);           // update the actual LED.</a:t>
+            </a:r>
+          </a:p>
+          <a:p>
+            <a:r>
+              <a:rPr lang="en-US" dirty="0"/>
+              <a:t>  }</a:t>
+            </a:r>
+          </a:p>
+          <a:p>
+            <a:r>
+              <a:rPr lang="en-US" dirty="0"/>
+              <a:t>}</a:t>
+            </a:r>
+          </a:p>
+          <a:p>
+            <a:endParaRPr lang="en-US" dirty="0"/>
+          </a:p>
+          <a:p>
+            <a:r>
+              <a:rPr lang="en-US" dirty="0"/>
+              <a:t>bool Led2::getState() {</a:t>
+            </a:r>
+          </a:p>
+          <a:p>
+            <a:r>
+              <a:rPr lang="en-US" dirty="0"/>
+              <a:t>  // return the current state of the led (True or False)</a:t>
+            </a:r>
+          </a:p>
+          <a:p>
+            <a:r>
+              <a:rPr lang="en-US" dirty="0"/>
+              <a:t>  return _state;</a:t>
+            </a:r>
+          </a:p>
+          <a:p>
+            <a:r>
+              <a:rPr lang="en-US" dirty="0"/>
+              <a:t>}</a:t>
+            </a:r>
+          </a:p>
+          <a:p>
+            <a:endParaRPr lang="en-US" dirty="0"/>
+          </a:p>
+          <a:p>
+            <a:r>
+              <a:rPr lang="en-US" dirty="0"/>
+              <a:t>bool Led2::getBlink() {</a:t>
+            </a:r>
+          </a:p>
+          <a:p>
+            <a:r>
+              <a:rPr lang="en-US" dirty="0"/>
+              <a:t>  // return the current blink state of the led (True or False)</a:t>
+            </a:r>
+          </a:p>
+          <a:p>
+            <a:r>
+              <a:rPr lang="en-US" dirty="0"/>
+              <a:t>  return _blink;</a:t>
+            </a:r>
+          </a:p>
+          <a:p>
+            <a:r>
+              <a:rPr lang="en-US" dirty="0"/>
+              <a:t>}</a:t>
+            </a:r>
+          </a:p>
+          <a:p>
+            <a:endParaRPr lang="en-US" dirty="0"/>
+          </a:p>
+          <a:p>
+            <a:r>
+              <a:rPr lang="en-US" dirty="0"/>
+              <a:t>void Led2::onTime(long on) {</a:t>
+            </a:r>
+          </a:p>
+          <a:p>
+            <a:r>
+              <a:rPr lang="en-US" dirty="0"/>
+              <a:t>  // update the desired on time of the led</a:t>
+            </a:r>
+          </a:p>
+          <a:p>
+            <a:r>
+              <a:rPr lang="en-US" dirty="0"/>
+              <a:t>  _onTime = on;</a:t>
+            </a:r>
+          </a:p>
+          <a:p>
+            <a:r>
+              <a:rPr lang="en-US" dirty="0"/>
+              <a:t>}</a:t>
+            </a:r>
+          </a:p>
+        </p:txBody>
+      </p:sp>
+    </p:spTree>
+    <p:extLst>
+      <p:ext uri="{BB962C8B-B14F-4D97-AF65-F5344CB8AC3E}">
+        <p14:creationId xmlns:p14="http://schemas.microsoft.com/office/powerpoint/2010/main" val="938415449"/>
+      </p:ext>
+    </p:extLst>
+  </p:cSld>
+  <p:clrMapOvr>
+    <a:masterClrMapping/>
+  </p:clrMapOvr>
+</p:sld>
+</file>
+
+<file path=ppt/slides/slide25.xml><?xml version="1.0" encoding="utf-8"?>
+<p:sld xmlns:a="http://schemas.openxmlformats.org/drawingml/2006/main" xmlns:r="http://schemas.openxmlformats.org/officeDocument/2006/relationships" xmlns:p="http://schemas.openxmlformats.org/presentationml/2006/main">
+  <p:cSld>
+    <p:spTree>
+      <p:nvGrpSpPr>
+        <p:cNvPr id="1" name=""/>
+        <p:cNvGrpSpPr/>
+        <p:nvPr/>
+      </p:nvGrpSpPr>
+      <p:grpSpPr>
+        <a:xfrm>
+          <a:off x="0" y="0"/>
+          <a:ext cx="0" cy="0"/>
+          <a:chOff x="0" y="0"/>
+          <a:chExt cx="0" cy="0"/>
+        </a:xfrm>
+      </p:grpSpPr>
+      <p:sp>
+        <p:nvSpPr>
+          <p:cNvPr id="4" name="Title 3"/>
+          <p:cNvSpPr>
+            <a:spLocks noGrp="1"/>
+          </p:cNvSpPr>
+          <p:nvPr>
+            <p:ph type="title"/>
+          </p:nvPr>
+        </p:nvSpPr>
+        <p:spPr>
+          <a:xfrm>
+            <a:off x="304800" y="133350"/>
+            <a:ext cx="7016194" cy="485987"/>
+          </a:xfrm>
+        </p:spPr>
+        <p:txBody>
+          <a:bodyPr>
+            <a:normAutofit fontScale="90000"/>
+          </a:bodyPr>
+          <a:lstStyle/>
+          <a:p>
+            <a:r>
+              <a:rPr lang="en-US" dirty="0"/>
+              <a:t>LED2.CPP  (3/3)</a:t>
+            </a:r>
+          </a:p>
+        </p:txBody>
+      </p:sp>
+      <p:pic>
+        <p:nvPicPr>
+          <p:cNvPr id="6" name="Picture 5">
+            <a:extLst>
+              <a:ext uri="{FF2B5EF4-FFF2-40B4-BE49-F238E27FC236}">
+                <a16:creationId xmlns:a16="http://schemas.microsoft.com/office/drawing/2014/main" id="{33351060-18E6-42F7-BAE2-6A49CB9B0F0C}"/>
+              </a:ext>
+            </a:extLst>
+          </p:cNvPr>
+          <p:cNvPicPr>
+            <a:picLocks noChangeAspect="1"/>
+          </p:cNvPicPr>
+          <p:nvPr/>
+        </p:nvPicPr>
+        <p:blipFill>
+          <a:blip r:embed="rId2" cstate="print">
+            <a:extLst>
+              <a:ext uri="{28A0092B-C50C-407E-A947-70E740481C1C}">
+                <a14:useLocalDpi xmlns:a14="http://schemas.microsoft.com/office/drawing/2010/main" val="0"/>
+              </a:ext>
+            </a:extLst>
+          </a:blip>
+          <a:stretch>
+            <a:fillRect/>
+          </a:stretch>
+        </p:blipFill>
+        <p:spPr>
+          <a:xfrm>
+            <a:off x="7848600" y="4583336"/>
+            <a:ext cx="1028700" cy="457771"/>
+          </a:xfrm>
+          <a:prstGeom prst="rect">
+            <a:avLst/>
+          </a:prstGeom>
+        </p:spPr>
+      </p:pic>
+      <p:sp>
+        <p:nvSpPr>
+          <p:cNvPr id="8" name="TextBox 7">
+            <a:extLst>
+              <a:ext uri="{FF2B5EF4-FFF2-40B4-BE49-F238E27FC236}">
+                <a16:creationId xmlns:a16="http://schemas.microsoft.com/office/drawing/2014/main" id="{A8209684-1BEE-4D92-A36E-99ADF8AACF2C}"/>
+              </a:ext>
+            </a:extLst>
+          </p:cNvPr>
+          <p:cNvSpPr txBox="1"/>
+          <p:nvPr/>
+        </p:nvSpPr>
+        <p:spPr>
+          <a:xfrm>
+            <a:off x="762000" y="742950"/>
+            <a:ext cx="7232226" cy="3216265"/>
+          </a:xfrm>
+          <a:prstGeom prst="rect">
+            <a:avLst/>
+          </a:prstGeom>
+          <a:noFill/>
+        </p:spPr>
+        <p:txBody>
+          <a:bodyPr wrap="square">
+            <a:spAutoFit/>
+          </a:bodyPr>
+          <a:lstStyle>
+            <a:defPPr>
+              <a:defRPr lang="en-US"/>
+            </a:defPPr>
+            <a:lvl1pPr>
+              <a:defRPr sz="700">
+                <a:latin typeface="Courier New" panose="02070309020205020404" pitchFamily="49" charset="0"/>
+                <a:cs typeface="Courier New" panose="02070309020205020404" pitchFamily="49" charset="0"/>
+              </a:defRPr>
+            </a:lvl1pPr>
+          </a:lstStyle>
+          <a:p>
+            <a:r>
+              <a:rPr lang="en-US" dirty="0"/>
+              <a:t>long Led2::onTime() {</a:t>
+            </a:r>
+          </a:p>
+          <a:p>
+            <a:r>
+              <a:rPr lang="en-US" dirty="0"/>
+              <a:t>  // return the current on time of the led</a:t>
+            </a:r>
+          </a:p>
+          <a:p>
+            <a:r>
+              <a:rPr lang="en-US" dirty="0"/>
+              <a:t>  return _onTime;</a:t>
+            </a:r>
+          </a:p>
+          <a:p>
+            <a:r>
+              <a:rPr lang="en-US" dirty="0"/>
+              <a:t>}</a:t>
+            </a:r>
+          </a:p>
+          <a:p>
+            <a:endParaRPr lang="en-US" dirty="0"/>
+          </a:p>
+          <a:p>
+            <a:r>
+              <a:rPr lang="en-US" dirty="0"/>
+              <a:t>void Led2::offTime(long off) {</a:t>
+            </a:r>
+          </a:p>
+          <a:p>
+            <a:r>
+              <a:rPr lang="en-US" dirty="0"/>
+              <a:t>  // update the desired off time of the led</a:t>
+            </a:r>
+          </a:p>
+          <a:p>
+            <a:r>
+              <a:rPr lang="en-US" dirty="0"/>
+              <a:t>  _offTime = off;</a:t>
+            </a:r>
+          </a:p>
+          <a:p>
+            <a:r>
+              <a:rPr lang="en-US" dirty="0"/>
+              <a:t>}</a:t>
+            </a:r>
+          </a:p>
+          <a:p>
+            <a:endParaRPr lang="en-US" dirty="0"/>
+          </a:p>
+          <a:p>
+            <a:r>
+              <a:rPr lang="en-US" dirty="0"/>
+              <a:t>long Led2::offTime() {</a:t>
+            </a:r>
+          </a:p>
+          <a:p>
+            <a:r>
+              <a:rPr lang="en-US" dirty="0"/>
+              <a:t>  // return the current off time of the led</a:t>
+            </a:r>
+          </a:p>
+          <a:p>
+            <a:r>
+              <a:rPr lang="en-US" dirty="0"/>
+              <a:t>  return _offTime;</a:t>
+            </a:r>
+          </a:p>
+          <a:p>
+            <a:r>
+              <a:rPr lang="en-US" dirty="0"/>
+              <a:t>}</a:t>
+            </a:r>
+          </a:p>
+          <a:p>
+            <a:endParaRPr lang="en-US" dirty="0"/>
+          </a:p>
+          <a:p>
+            <a:r>
+              <a:rPr lang="en-US" dirty="0"/>
+              <a:t>void Led2::off() {</a:t>
+            </a:r>
+          </a:p>
+          <a:p>
+            <a:r>
+              <a:rPr lang="en-US" dirty="0"/>
+              <a:t>  _blink = false;         // Turn off blink mode</a:t>
+            </a:r>
+          </a:p>
+          <a:p>
+            <a:r>
+              <a:rPr lang="en-US" dirty="0"/>
+              <a:t>  _state = LOW;           // Set the desired state - LED will turn off on next call to update</a:t>
+            </a:r>
+          </a:p>
+          <a:p>
+            <a:r>
+              <a:rPr lang="en-US" dirty="0"/>
+              <a:t>}</a:t>
+            </a:r>
+          </a:p>
+          <a:p>
+            <a:endParaRPr lang="en-US" dirty="0"/>
+          </a:p>
+          <a:p>
+            <a:r>
+              <a:rPr lang="en-US" dirty="0"/>
+              <a:t>void Led2::on() {</a:t>
+            </a:r>
+          </a:p>
+          <a:p>
+            <a:r>
+              <a:rPr lang="en-US" dirty="0"/>
+              <a:t>  _blink = false;         // Turn off blink mode</a:t>
+            </a:r>
+          </a:p>
+          <a:p>
+            <a:r>
+              <a:rPr lang="en-US" dirty="0"/>
+              <a:t>  _state = HIGH;          // Set the desired state - LED will turn on </a:t>
+            </a:r>
+            <a:r>
+              <a:rPr lang="en-US" dirty="0" err="1"/>
+              <a:t>on</a:t>
+            </a:r>
+            <a:r>
+              <a:rPr lang="en-US" dirty="0"/>
+              <a:t> next call to update</a:t>
+            </a:r>
+          </a:p>
+          <a:p>
+            <a:r>
+              <a:rPr lang="en-US" dirty="0"/>
+              <a:t>}</a:t>
+            </a:r>
+          </a:p>
+          <a:p>
+            <a:endParaRPr lang="en-US" dirty="0"/>
+          </a:p>
+          <a:p>
+            <a:r>
+              <a:rPr lang="en-US" dirty="0"/>
+              <a:t>void Led2::blink() {</a:t>
+            </a:r>
+          </a:p>
+          <a:p>
+            <a:r>
+              <a:rPr lang="en-US" dirty="0"/>
+              <a:t>  _blink = true;           // Turn on blink mode</a:t>
+            </a:r>
+          </a:p>
+          <a:p>
+            <a:r>
+              <a:rPr lang="en-US" dirty="0"/>
+              <a:t>  // Set the desired state - LED will start blinking as of next call to update</a:t>
+            </a:r>
+          </a:p>
+          <a:p>
+            <a:r>
+              <a:rPr lang="en-US" dirty="0"/>
+              <a:t>}</a:t>
+            </a:r>
+          </a:p>
+        </p:txBody>
+      </p:sp>
+    </p:spTree>
+    <p:extLst>
+      <p:ext uri="{BB962C8B-B14F-4D97-AF65-F5344CB8AC3E}">
+        <p14:creationId xmlns:p14="http://schemas.microsoft.com/office/powerpoint/2010/main" val="3076363163"/>
+      </p:ext>
+    </p:extLst>
+  </p:cSld>
+  <p:clrMapOvr>
+    <a:masterClrMapping/>
+  </p:clrMapOvr>
+</p:sld>
+</file>
+
+<file path=ppt/slides/slide26.xml><?xml version="1.0" encoding="utf-8"?>
 <p:sld xmlns:a="http://schemas.openxmlformats.org/drawingml/2006/main" xmlns:r="http://schemas.openxmlformats.org/officeDocument/2006/relationships" xmlns:p="http://schemas.openxmlformats.org/presentationml/2006/main">
   <p:cSld>
     <p:spTree>
@@ -13466,7 +15367,7 @@
             </a:pPr>
             <a:r>
               <a:rPr lang="en-US" sz="1800" dirty="0"/>
-              <a:t>int, string, float, char[] and others</a:t>
+              <a:t>int, string, float, char[], bool and others</a:t>
             </a:r>
           </a:p>
           <a:p>
@@ -13488,7 +15389,18 @@
             </a:pPr>
             <a:r>
               <a:rPr lang="en-US" sz="1800" dirty="0"/>
-              <a:t>Lots of on line help available if needed (see references)</a:t>
+              <a:t>When we declare a type we tell the compiler how to interpret the binary</a:t>
+            </a:r>
+          </a:p>
+          <a:p>
+            <a:pPr marL="457200" lvl="1">
+              <a:spcBef>
+                <a:spcPts val="0"/>
+              </a:spcBef>
+            </a:pPr>
+            <a:r>
+              <a:rPr lang="en-US" sz="1800" dirty="0"/>
+              <a:t>In programming these are ‘bread and butter’ concepts</a:t>
             </a:r>
           </a:p>
           <a:p>
@@ -13500,41 +15412,118 @@
             <a:endParaRPr lang="en-US" sz="1800" dirty="0"/>
           </a:p>
           <a:p>
-            <a:pPr marL="457200" lvl="1">
+            <a:pPr marL="685800" lvl="1" indent="0">
               <a:spcBef>
                 <a:spcPts val="0"/>
               </a:spcBef>
+              <a:buNone/>
             </a:pPr>
-            <a:endParaRPr lang="en-US" sz="1800" dirty="0"/>
-          </a:p>
-          <a:p>
-            <a:pPr marL="457200" lvl="1">
+            <a:r>
+              <a:rPr lang="en-US" sz="1400" dirty="0">
+                <a:solidFill>
+                  <a:srgbClr val="0066FF"/>
+                </a:solidFill>
+                <a:latin typeface="Courier New" panose="02070309020205020404" pitchFamily="49" charset="0"/>
+                <a:cs typeface="Courier New" panose="02070309020205020404" pitchFamily="49" charset="0"/>
+              </a:rPr>
+              <a:t>int x = 5;</a:t>
+            </a:r>
+          </a:p>
+          <a:p>
+            <a:pPr marL="685800" lvl="1" indent="0">
               <a:spcBef>
                 <a:spcPts val="0"/>
               </a:spcBef>
+              <a:buNone/>
             </a:pPr>
-            <a:endParaRPr lang="en-US" sz="1800" dirty="0"/>
-          </a:p>
-          <a:p>
-            <a:pPr marL="457200" lvl="1">
+            <a:r>
+              <a:rPr lang="en-US" sz="1400" dirty="0">
+                <a:solidFill>
+                  <a:srgbClr val="0066FF"/>
+                </a:solidFill>
+                <a:latin typeface="Courier New" panose="02070309020205020404" pitchFamily="49" charset="0"/>
+                <a:cs typeface="Courier New" panose="02070309020205020404" pitchFamily="49" charset="0"/>
+              </a:rPr>
+              <a:t>bool </a:t>
+            </a:r>
+            <a:r>
+              <a:rPr lang="en-US" sz="1400" dirty="0" err="1">
+                <a:solidFill>
+                  <a:srgbClr val="0066FF"/>
+                </a:solidFill>
+                <a:latin typeface="Courier New" panose="02070309020205020404" pitchFamily="49" charset="0"/>
+                <a:cs typeface="Courier New" panose="02070309020205020404" pitchFamily="49" charset="0"/>
+              </a:rPr>
+              <a:t>isPlaying</a:t>
+            </a:r>
+            <a:r>
+              <a:rPr lang="en-US" sz="1400" dirty="0">
+                <a:solidFill>
+                  <a:srgbClr val="0066FF"/>
+                </a:solidFill>
+                <a:latin typeface="Courier New" panose="02070309020205020404" pitchFamily="49" charset="0"/>
+                <a:cs typeface="Courier New" panose="02070309020205020404" pitchFamily="49" charset="0"/>
+              </a:rPr>
+              <a:t> = false;</a:t>
+            </a:r>
+          </a:p>
+          <a:p>
+            <a:pPr marL="685800" lvl="1" indent="0">
               <a:spcBef>
                 <a:spcPts val="0"/>
               </a:spcBef>
+              <a:buNone/>
             </a:pPr>
             <a:r>
-              <a:rPr lang="en-US" sz="1800" dirty="0"/>
-              <a:t>When we declare a type we tell the compiler how to interpret the binary</a:t>
-            </a:r>
-          </a:p>
-          <a:p>
-            <a:pPr marL="457200" lvl="1">
+              <a:rPr lang="en-US" sz="1400" dirty="0">
+                <a:solidFill>
+                  <a:srgbClr val="0066FF"/>
+                </a:solidFill>
+                <a:latin typeface="Courier New" panose="02070309020205020404" pitchFamily="49" charset="0"/>
+                <a:cs typeface="Courier New" panose="02070309020205020404" pitchFamily="49" charset="0"/>
+              </a:rPr>
+              <a:t>String </a:t>
+            </a:r>
+            <a:r>
+              <a:rPr lang="en-US" sz="1400" dirty="0" err="1">
+                <a:solidFill>
+                  <a:srgbClr val="0066FF"/>
+                </a:solidFill>
+                <a:latin typeface="Courier New" panose="02070309020205020404" pitchFamily="49" charset="0"/>
+                <a:cs typeface="Courier New" panose="02070309020205020404" pitchFamily="49" charset="0"/>
+              </a:rPr>
+              <a:t>fname</a:t>
+            </a:r>
+            <a:r>
+              <a:rPr lang="en-US" sz="1400" dirty="0">
+                <a:solidFill>
+                  <a:srgbClr val="0066FF"/>
+                </a:solidFill>
+                <a:latin typeface="Courier New" panose="02070309020205020404" pitchFamily="49" charset="0"/>
+                <a:cs typeface="Courier New" panose="02070309020205020404" pitchFamily="49" charset="0"/>
+              </a:rPr>
+              <a:t> = “Fred”;</a:t>
+            </a:r>
+          </a:p>
+          <a:p>
+            <a:pPr marL="171450" lvl="1" indent="0">
               <a:spcBef>
                 <a:spcPts val="0"/>
               </a:spcBef>
+              <a:buNone/>
             </a:pPr>
+            <a:endParaRPr lang="en-US" sz="1800" dirty="0"/>
+          </a:p>
+          <a:p>
+            <a:pPr marL="171450" lvl="1" indent="0">
+              <a:spcBef>
+                <a:spcPts val="0"/>
+              </a:spcBef>
+              <a:buNone/>
+            </a:pPr>
             <a:r>
               <a:rPr lang="en-US" sz="1800" dirty="0"/>
-              <a:t>(one bit for the sign bit, x bits for the number)</a:t>
+              <a:t>Lots of on line help available if needed (see references)</a:t>
             </a:r>
           </a:p>
           <a:p>
@@ -13893,7 +15882,7 @@
             </a:pPr>
             <a:r>
               <a:rPr lang="en-US" sz="1800" dirty="0"/>
-              <a:t>refer to the component parts like this:</a:t>
+              <a:t>refer to the individual component parts like this:</a:t>
             </a:r>
           </a:p>
           <a:p>
@@ -13987,13 +15976,8 @@
             </a:pPr>
             <a:r>
               <a:rPr lang="en-US" sz="1800" dirty="0"/>
-              <a:t>We most often use structures to handle related data as a single unit.</a:t>
-            </a:r>
-          </a:p>
-          <a:p>
-            <a:pPr marL="0" indent="0">
-              <a:buNone/>
-            </a:pPr>
+              <a:t>I use structures to handle related data as though it were a single unit.</a:t>
+            </a:r>
             <a:endParaRPr lang="en-US" sz="2400" dirty="0"/>
           </a:p>
           <a:p>
@@ -14139,7 +16123,7 @@
           <a:p>
             <a:r>
               <a:rPr lang="en-US" sz="2000" dirty="0"/>
-              <a:t>It can also be thought of as a user defined type</a:t>
+              <a:t>It too can be thought of as a user defined type</a:t>
             </a:r>
           </a:p>
           <a:p>
@@ -17266,9 +19250,9 @@
         <p:grpSpPr>
           <a:xfrm>
             <a:off x="2771685" y="3573344"/>
-            <a:ext cx="3157850" cy="1355660"/>
+            <a:ext cx="3476714" cy="1355660"/>
             <a:chOff x="2874521" y="2549547"/>
-            <a:chExt cx="3157850" cy="1355660"/>
+            <a:chExt cx="3476714" cy="1355660"/>
           </a:xfrm>
         </p:grpSpPr>
         <p:sp>
@@ -17338,8 +19322,8 @@
           </p:nvSpPr>
           <p:spPr>
             <a:xfrm>
-              <a:off x="3587615" y="3381987"/>
-              <a:ext cx="2444756" cy="523220"/>
+              <a:off x="3587614" y="3381987"/>
+              <a:ext cx="2763621" cy="523220"/>
             </a:xfrm>
             <a:prstGeom prst="rect">
               <a:avLst/>
@@ -17358,7 +19342,7 @@
                     <a:srgbClr val="FF0000"/>
                   </a:solidFill>
                 </a:rPr>
-                <a:t>A passed parameter to be used when first creating the object </a:t>
+                <a:t>A passed parameter to be used when first constructing the object </a:t>
               </a:r>
             </a:p>
           </p:txBody>
@@ -17457,11 +19441,7 @@
               <a:t>myLed1</a:t>
             </a:r>
             <a:r>
-              <a:rPr lang="en-US" sz="1400" dirty="0">
-                <a:solidFill>
-                  <a:schemeClr val="bg1"/>
-                </a:solidFill>
-              </a:rPr>
+              <a:rPr lang="en-US" sz="1400" dirty="0"/>
               <a:t> = </a:t>
             </a:r>
             <a:r>
@@ -17996,7 +19976,19 @@
                   <a:schemeClr val="bg1"/>
                 </a:solidFill>
               </a:rPr>
-              <a:t> = </a:t>
+              <a:t> </a:t>
+            </a:r>
+            <a:r>
+              <a:rPr lang="en-US" sz="1400" dirty="0"/>
+              <a:t>=</a:t>
+            </a:r>
+            <a:r>
+              <a:rPr lang="en-US" sz="1400" dirty="0">
+                <a:solidFill>
+                  <a:schemeClr val="bg1"/>
+                </a:solidFill>
+              </a:rPr>
+              <a:t> </a:t>
             </a:r>
             <a:r>
               <a:rPr lang="en-US" sz="1400" b="1" dirty="0">

</xml_diff>